<commit_message>
NU.. er den finalized
</commit_message>
<xml_diff>
--- a/The Next præsentation.pptx
+++ b/The Next præsentation.pptx
@@ -120,6 +120,2746 @@
     </p:ext>
   </p:extLst>
 </p:presentation>
+</file>
+
+<file path=ppt/diagrams/colors1.xml><?xml version="1.0" encoding="utf-8"?>
+<dgm:colorsDef xmlns:dgm="http://schemas.openxmlformats.org/drawingml/2006/diagram" xmlns:a="http://schemas.openxmlformats.org/drawingml/2006/main" uniqueId="urn:microsoft.com/office/officeart/2005/8/colors/colorful2">
+  <dgm:title val=""/>
+  <dgm:desc val=""/>
+  <dgm:catLst>
+    <dgm:cat type="colorful" pri="10200"/>
+  </dgm:catLst>
+  <dgm:styleLbl name="node0">
+    <dgm:fillClrLst meth="repeat">
+      <a:schemeClr val="accent1"/>
+    </dgm:fillClrLst>
+    <dgm:linClrLst meth="repeat">
+      <a:schemeClr val="lt1"/>
+    </dgm:linClrLst>
+    <dgm:effectClrLst/>
+    <dgm:txLinClrLst/>
+    <dgm:txFillClrLst/>
+    <dgm:txEffectClrLst/>
+  </dgm:styleLbl>
+  <dgm:styleLbl name="node1">
+    <dgm:fillClrLst>
+      <a:schemeClr val="accent2"/>
+      <a:schemeClr val="accent3"/>
+    </dgm:fillClrLst>
+    <dgm:linClrLst meth="repeat">
+      <a:schemeClr val="lt1"/>
+    </dgm:linClrLst>
+    <dgm:effectClrLst/>
+    <dgm:txLinClrLst/>
+    <dgm:txFillClrLst/>
+    <dgm:txEffectClrLst/>
+  </dgm:styleLbl>
+  <dgm:styleLbl name="alignNode1">
+    <dgm:fillClrLst>
+      <a:schemeClr val="accent2"/>
+      <a:schemeClr val="accent3"/>
+    </dgm:fillClrLst>
+    <dgm:linClrLst>
+      <a:schemeClr val="accent2"/>
+      <a:schemeClr val="accent3"/>
+    </dgm:linClrLst>
+    <dgm:effectClrLst/>
+    <dgm:txLinClrLst/>
+    <dgm:txFillClrLst/>
+    <dgm:txEffectClrLst/>
+  </dgm:styleLbl>
+  <dgm:styleLbl name="lnNode1">
+    <dgm:fillClrLst>
+      <a:schemeClr val="accent2"/>
+      <a:schemeClr val="accent3"/>
+    </dgm:fillClrLst>
+    <dgm:linClrLst meth="repeat">
+      <a:schemeClr val="lt1"/>
+    </dgm:linClrLst>
+    <dgm:effectClrLst/>
+    <dgm:txLinClrLst/>
+    <dgm:txFillClrLst/>
+    <dgm:txEffectClrLst/>
+  </dgm:styleLbl>
+  <dgm:styleLbl name="vennNode1">
+    <dgm:fillClrLst>
+      <a:schemeClr val="accent2">
+        <a:alpha val="50000"/>
+      </a:schemeClr>
+      <a:schemeClr val="accent3">
+        <a:alpha val="50000"/>
+      </a:schemeClr>
+    </dgm:fillClrLst>
+    <dgm:linClrLst meth="repeat">
+      <a:schemeClr val="lt1"/>
+    </dgm:linClrLst>
+    <dgm:effectClrLst/>
+    <dgm:txLinClrLst/>
+    <dgm:txFillClrLst/>
+    <dgm:txEffectClrLst/>
+  </dgm:styleLbl>
+  <dgm:styleLbl name="node2">
+    <dgm:fillClrLst>
+      <a:schemeClr val="accent3"/>
+    </dgm:fillClrLst>
+    <dgm:linClrLst meth="repeat">
+      <a:schemeClr val="lt1"/>
+    </dgm:linClrLst>
+    <dgm:effectClrLst/>
+    <dgm:txLinClrLst/>
+    <dgm:txFillClrLst/>
+    <dgm:txEffectClrLst/>
+  </dgm:styleLbl>
+  <dgm:styleLbl name="node3">
+    <dgm:fillClrLst>
+      <a:schemeClr val="accent4"/>
+    </dgm:fillClrLst>
+    <dgm:linClrLst meth="repeat">
+      <a:schemeClr val="lt1"/>
+    </dgm:linClrLst>
+    <dgm:effectClrLst/>
+    <dgm:txLinClrLst/>
+    <dgm:txFillClrLst/>
+    <dgm:txEffectClrLst/>
+  </dgm:styleLbl>
+  <dgm:styleLbl name="node4">
+    <dgm:fillClrLst>
+      <a:schemeClr val="accent5"/>
+    </dgm:fillClrLst>
+    <dgm:linClrLst meth="repeat">
+      <a:schemeClr val="lt1"/>
+    </dgm:linClrLst>
+    <dgm:effectClrLst/>
+    <dgm:txLinClrLst/>
+    <dgm:txFillClrLst/>
+    <dgm:txEffectClrLst/>
+  </dgm:styleLbl>
+  <dgm:styleLbl name="fgImgPlace1">
+    <dgm:fillClrLst>
+      <a:schemeClr val="accent2">
+        <a:tint val="50000"/>
+      </a:schemeClr>
+      <a:schemeClr val="accent3">
+        <a:tint val="50000"/>
+      </a:schemeClr>
+    </dgm:fillClrLst>
+    <dgm:linClrLst meth="repeat">
+      <a:schemeClr val="lt1"/>
+    </dgm:linClrLst>
+    <dgm:effectClrLst/>
+    <dgm:txLinClrLst/>
+    <dgm:txFillClrLst meth="repeat">
+      <a:schemeClr val="lt1"/>
+    </dgm:txFillClrLst>
+    <dgm:txEffectClrLst/>
+  </dgm:styleLbl>
+  <dgm:styleLbl name="alignImgPlace1">
+    <dgm:fillClrLst>
+      <a:schemeClr val="accent2">
+        <a:tint val="50000"/>
+      </a:schemeClr>
+      <a:schemeClr val="accent3">
+        <a:tint val="20000"/>
+      </a:schemeClr>
+    </dgm:fillClrLst>
+    <dgm:linClrLst meth="repeat">
+      <a:schemeClr val="lt1"/>
+    </dgm:linClrLst>
+    <dgm:effectClrLst/>
+    <dgm:txLinClrLst/>
+    <dgm:txFillClrLst meth="repeat">
+      <a:schemeClr val="lt1"/>
+    </dgm:txFillClrLst>
+    <dgm:txEffectClrLst/>
+  </dgm:styleLbl>
+  <dgm:styleLbl name="bgImgPlace1">
+    <dgm:fillClrLst>
+      <a:schemeClr val="accent2">
+        <a:tint val="50000"/>
+      </a:schemeClr>
+      <a:schemeClr val="accent3">
+        <a:tint val="20000"/>
+      </a:schemeClr>
+    </dgm:fillClrLst>
+    <dgm:linClrLst meth="repeat">
+      <a:schemeClr val="lt1"/>
+    </dgm:linClrLst>
+    <dgm:effectClrLst/>
+    <dgm:txLinClrLst/>
+    <dgm:txFillClrLst meth="repeat">
+      <a:schemeClr val="lt1"/>
+    </dgm:txFillClrLst>
+    <dgm:txEffectClrLst/>
+  </dgm:styleLbl>
+  <dgm:styleLbl name="sibTrans2D1">
+    <dgm:fillClrLst>
+      <a:schemeClr val="accent2"/>
+      <a:schemeClr val="accent3"/>
+    </dgm:fillClrLst>
+    <dgm:linClrLst meth="repeat">
+      <a:schemeClr val="lt1"/>
+    </dgm:linClrLst>
+    <dgm:effectClrLst/>
+    <dgm:txLinClrLst/>
+    <dgm:txFillClrLst/>
+    <dgm:txEffectClrLst/>
+  </dgm:styleLbl>
+  <dgm:styleLbl name="fgSibTrans2D1">
+    <dgm:fillClrLst>
+      <a:schemeClr val="accent2"/>
+      <a:schemeClr val="accent3"/>
+    </dgm:fillClrLst>
+    <dgm:linClrLst meth="repeat">
+      <a:schemeClr val="lt1"/>
+    </dgm:linClrLst>
+    <dgm:effectClrLst/>
+    <dgm:txLinClrLst/>
+    <dgm:txFillClrLst meth="repeat">
+      <a:schemeClr val="lt1"/>
+    </dgm:txFillClrLst>
+    <dgm:txEffectClrLst/>
+  </dgm:styleLbl>
+  <dgm:styleLbl name="bgSibTrans2D1">
+    <dgm:fillClrLst>
+      <a:schemeClr val="accent2"/>
+      <a:schemeClr val="accent3"/>
+    </dgm:fillClrLst>
+    <dgm:linClrLst meth="repeat">
+      <a:schemeClr val="lt1"/>
+    </dgm:linClrLst>
+    <dgm:effectClrLst/>
+    <dgm:txLinClrLst/>
+    <dgm:txFillClrLst meth="repeat">
+      <a:schemeClr val="lt1"/>
+    </dgm:txFillClrLst>
+    <dgm:txEffectClrLst/>
+  </dgm:styleLbl>
+  <dgm:styleLbl name="sibTrans1D1">
+    <dgm:fillClrLst/>
+    <dgm:linClrLst>
+      <a:schemeClr val="accent2"/>
+      <a:schemeClr val="accent3"/>
+    </dgm:linClrLst>
+    <dgm:effectClrLst/>
+    <dgm:txLinClrLst/>
+    <dgm:txFillClrLst meth="repeat">
+      <a:schemeClr val="tx1"/>
+    </dgm:txFillClrLst>
+    <dgm:txEffectClrLst/>
+  </dgm:styleLbl>
+  <dgm:styleLbl name="callout">
+    <dgm:fillClrLst meth="repeat">
+      <a:schemeClr val="accent2"/>
+    </dgm:fillClrLst>
+    <dgm:linClrLst meth="repeat">
+      <a:schemeClr val="accent2">
+        <a:tint val="50000"/>
+      </a:schemeClr>
+    </dgm:linClrLst>
+    <dgm:effectClrLst/>
+    <dgm:txLinClrLst/>
+    <dgm:txFillClrLst meth="repeat">
+      <a:schemeClr val="tx1"/>
+    </dgm:txFillClrLst>
+    <dgm:txEffectClrLst/>
+  </dgm:styleLbl>
+  <dgm:styleLbl name="asst0">
+    <dgm:fillClrLst meth="repeat">
+      <a:schemeClr val="accent2"/>
+    </dgm:fillClrLst>
+    <dgm:linClrLst meth="repeat">
+      <a:schemeClr val="lt1">
+        <a:shade val="80000"/>
+      </a:schemeClr>
+    </dgm:linClrLst>
+    <dgm:effectClrLst/>
+    <dgm:txLinClrLst/>
+    <dgm:txFillClrLst/>
+    <dgm:txEffectClrLst/>
+  </dgm:styleLbl>
+  <dgm:styleLbl name="asst1">
+    <dgm:fillClrLst meth="repeat">
+      <a:schemeClr val="accent3"/>
+    </dgm:fillClrLst>
+    <dgm:linClrLst meth="repeat">
+      <a:schemeClr val="lt1">
+        <a:shade val="80000"/>
+      </a:schemeClr>
+    </dgm:linClrLst>
+    <dgm:effectClrLst/>
+    <dgm:txLinClrLst/>
+    <dgm:txFillClrLst/>
+    <dgm:txEffectClrLst/>
+  </dgm:styleLbl>
+  <dgm:styleLbl name="asst2">
+    <dgm:fillClrLst>
+      <a:schemeClr val="accent4"/>
+    </dgm:fillClrLst>
+    <dgm:linClrLst meth="repeat">
+      <a:schemeClr val="lt1"/>
+    </dgm:linClrLst>
+    <dgm:effectClrLst/>
+    <dgm:txLinClrLst/>
+    <dgm:txFillClrLst/>
+    <dgm:txEffectClrLst/>
+  </dgm:styleLbl>
+  <dgm:styleLbl name="asst3">
+    <dgm:fillClrLst>
+      <a:schemeClr val="accent5"/>
+    </dgm:fillClrLst>
+    <dgm:linClrLst meth="repeat">
+      <a:schemeClr val="lt1"/>
+    </dgm:linClrLst>
+    <dgm:effectClrLst/>
+    <dgm:txLinClrLst/>
+    <dgm:txFillClrLst/>
+    <dgm:txEffectClrLst/>
+  </dgm:styleLbl>
+  <dgm:styleLbl name="asst4">
+    <dgm:fillClrLst>
+      <a:schemeClr val="accent6"/>
+    </dgm:fillClrLst>
+    <dgm:linClrLst meth="repeat">
+      <a:schemeClr val="lt1"/>
+    </dgm:linClrLst>
+    <dgm:effectClrLst/>
+    <dgm:txLinClrLst/>
+    <dgm:txFillClrLst/>
+    <dgm:txEffectClrLst/>
+  </dgm:styleLbl>
+  <dgm:styleLbl name="parChTrans2D1">
+    <dgm:fillClrLst meth="repeat">
+      <a:schemeClr val="accent2"/>
+    </dgm:fillClrLst>
+    <dgm:linClrLst meth="repeat">
+      <a:schemeClr val="lt1"/>
+    </dgm:linClrLst>
+    <dgm:effectClrLst/>
+    <dgm:txLinClrLst/>
+    <dgm:txFillClrLst meth="repeat">
+      <a:schemeClr val="lt1"/>
+    </dgm:txFillClrLst>
+    <dgm:txEffectClrLst/>
+  </dgm:styleLbl>
+  <dgm:styleLbl name="parChTrans2D2">
+    <dgm:fillClrLst meth="repeat">
+      <a:schemeClr val="accent3"/>
+    </dgm:fillClrLst>
+    <dgm:linClrLst meth="repeat">
+      <a:schemeClr val="lt1"/>
+    </dgm:linClrLst>
+    <dgm:effectClrLst/>
+    <dgm:txLinClrLst/>
+    <dgm:txFillClrLst/>
+    <dgm:txEffectClrLst/>
+  </dgm:styleLbl>
+  <dgm:styleLbl name="parChTrans2D3">
+    <dgm:fillClrLst meth="repeat">
+      <a:schemeClr val="accent4"/>
+    </dgm:fillClrLst>
+    <dgm:linClrLst meth="repeat">
+      <a:schemeClr val="lt1"/>
+    </dgm:linClrLst>
+    <dgm:effectClrLst/>
+    <dgm:txLinClrLst/>
+    <dgm:txFillClrLst/>
+    <dgm:txEffectClrLst/>
+  </dgm:styleLbl>
+  <dgm:styleLbl name="parChTrans2D4">
+    <dgm:fillClrLst meth="repeat">
+      <a:schemeClr val="accent5"/>
+    </dgm:fillClrLst>
+    <dgm:linClrLst meth="repeat">
+      <a:schemeClr val="lt1"/>
+    </dgm:linClrLst>
+    <dgm:effectClrLst/>
+    <dgm:txLinClrLst/>
+    <dgm:txFillClrLst meth="repeat">
+      <a:schemeClr val="lt1"/>
+    </dgm:txFillClrLst>
+    <dgm:txEffectClrLst/>
+  </dgm:styleLbl>
+  <dgm:styleLbl name="parChTrans1D1">
+    <dgm:fillClrLst meth="repeat">
+      <a:schemeClr val="accent2"/>
+    </dgm:fillClrLst>
+    <dgm:linClrLst meth="repeat">
+      <a:schemeClr val="accent2"/>
+    </dgm:linClrLst>
+    <dgm:effectClrLst/>
+    <dgm:txLinClrLst/>
+    <dgm:txFillClrLst meth="repeat">
+      <a:schemeClr val="tx1"/>
+    </dgm:txFillClrLst>
+    <dgm:txEffectClrLst/>
+  </dgm:styleLbl>
+  <dgm:styleLbl name="parChTrans1D2">
+    <dgm:fillClrLst meth="repeat">
+      <a:schemeClr val="accent2">
+        <a:tint val="90000"/>
+      </a:schemeClr>
+    </dgm:fillClrLst>
+    <dgm:linClrLst meth="repeat">
+      <a:schemeClr val="accent3"/>
+    </dgm:linClrLst>
+    <dgm:effectClrLst/>
+    <dgm:txLinClrLst/>
+    <dgm:txFillClrLst meth="repeat">
+      <a:schemeClr val="tx1"/>
+    </dgm:txFillClrLst>
+    <dgm:txEffectClrLst/>
+  </dgm:styleLbl>
+  <dgm:styleLbl name="parChTrans1D3">
+    <dgm:fillClrLst meth="repeat">
+      <a:schemeClr val="accent2">
+        <a:tint val="70000"/>
+      </a:schemeClr>
+    </dgm:fillClrLst>
+    <dgm:linClrLst meth="repeat">
+      <a:schemeClr val="accent4"/>
+    </dgm:linClrLst>
+    <dgm:effectClrLst/>
+    <dgm:txLinClrLst/>
+    <dgm:txFillClrLst meth="repeat">
+      <a:schemeClr val="tx1"/>
+    </dgm:txFillClrLst>
+    <dgm:txEffectClrLst/>
+  </dgm:styleLbl>
+  <dgm:styleLbl name="parChTrans1D4">
+    <dgm:fillClrLst meth="repeat">
+      <a:schemeClr val="accent2">
+        <a:tint val="50000"/>
+      </a:schemeClr>
+    </dgm:fillClrLst>
+    <dgm:linClrLst meth="repeat">
+      <a:schemeClr val="accent5"/>
+    </dgm:linClrLst>
+    <dgm:effectClrLst/>
+    <dgm:txLinClrLst/>
+    <dgm:txFillClrLst meth="repeat">
+      <a:schemeClr val="tx1"/>
+    </dgm:txFillClrLst>
+    <dgm:txEffectClrLst/>
+  </dgm:styleLbl>
+  <dgm:styleLbl name="fgAcc1">
+    <dgm:fillClrLst meth="repeat">
+      <a:schemeClr val="lt1">
+        <a:alpha val="90000"/>
+      </a:schemeClr>
+    </dgm:fillClrLst>
+    <dgm:linClrLst>
+      <a:schemeClr val="accent2"/>
+      <a:schemeClr val="accent3"/>
+    </dgm:linClrLst>
+    <dgm:effectClrLst/>
+    <dgm:txLinClrLst/>
+    <dgm:txFillClrLst meth="repeat">
+      <a:schemeClr val="dk1"/>
+    </dgm:txFillClrLst>
+    <dgm:txEffectClrLst/>
+  </dgm:styleLbl>
+  <dgm:styleLbl name="conFgAcc1">
+    <dgm:fillClrLst meth="repeat">
+      <a:schemeClr val="lt1">
+        <a:alpha val="90000"/>
+      </a:schemeClr>
+    </dgm:fillClrLst>
+    <dgm:linClrLst>
+      <a:schemeClr val="accent2"/>
+      <a:schemeClr val="accent3"/>
+    </dgm:linClrLst>
+    <dgm:effectClrLst/>
+    <dgm:txLinClrLst/>
+    <dgm:txFillClrLst meth="repeat">
+      <a:schemeClr val="dk1"/>
+    </dgm:txFillClrLst>
+    <dgm:txEffectClrLst/>
+  </dgm:styleLbl>
+  <dgm:styleLbl name="alignAcc1">
+    <dgm:fillClrLst meth="repeat">
+      <a:schemeClr val="lt1">
+        <a:alpha val="90000"/>
+      </a:schemeClr>
+    </dgm:fillClrLst>
+    <dgm:linClrLst>
+      <a:schemeClr val="accent2"/>
+      <a:schemeClr val="accent3"/>
+    </dgm:linClrLst>
+    <dgm:effectClrLst/>
+    <dgm:txLinClrLst/>
+    <dgm:txFillClrLst meth="repeat">
+      <a:schemeClr val="dk1"/>
+    </dgm:txFillClrLst>
+    <dgm:txEffectClrLst/>
+  </dgm:styleLbl>
+  <dgm:styleLbl name="trAlignAcc1">
+    <dgm:fillClrLst meth="repeat">
+      <a:schemeClr val="lt1">
+        <a:alpha val="40000"/>
+      </a:schemeClr>
+    </dgm:fillClrLst>
+    <dgm:linClrLst meth="repeat">
+      <a:schemeClr val="accent2"/>
+    </dgm:linClrLst>
+    <dgm:effectClrLst/>
+    <dgm:txLinClrLst/>
+    <dgm:txFillClrLst meth="repeat">
+      <a:schemeClr val="dk1"/>
+    </dgm:txFillClrLst>
+    <dgm:txEffectClrLst/>
+  </dgm:styleLbl>
+  <dgm:styleLbl name="bgAcc1">
+    <dgm:fillClrLst meth="repeat">
+      <a:schemeClr val="lt1">
+        <a:alpha val="90000"/>
+      </a:schemeClr>
+    </dgm:fillClrLst>
+    <dgm:linClrLst>
+      <a:schemeClr val="accent2"/>
+      <a:schemeClr val="accent3"/>
+    </dgm:linClrLst>
+    <dgm:effectClrLst/>
+    <dgm:txLinClrLst/>
+    <dgm:txFillClrLst meth="repeat">
+      <a:schemeClr val="dk1"/>
+    </dgm:txFillClrLst>
+    <dgm:txEffectClrLst/>
+  </dgm:styleLbl>
+  <dgm:styleLbl name="solidFgAcc1">
+    <dgm:fillClrLst meth="repeat">
+      <a:schemeClr val="lt1"/>
+    </dgm:fillClrLst>
+    <dgm:linClrLst>
+      <a:schemeClr val="accent2"/>
+      <a:schemeClr val="accent3"/>
+    </dgm:linClrLst>
+    <dgm:effectClrLst/>
+    <dgm:txLinClrLst/>
+    <dgm:txFillClrLst meth="repeat">
+      <a:schemeClr val="dk1"/>
+    </dgm:txFillClrLst>
+    <dgm:txEffectClrLst/>
+  </dgm:styleLbl>
+  <dgm:styleLbl name="solidAlignAcc1">
+    <dgm:fillClrLst meth="repeat">
+      <a:schemeClr val="lt1"/>
+    </dgm:fillClrLst>
+    <dgm:linClrLst>
+      <a:schemeClr val="accent2"/>
+      <a:schemeClr val="accent3"/>
+    </dgm:linClrLst>
+    <dgm:effectClrLst/>
+    <dgm:txLinClrLst/>
+    <dgm:txFillClrLst meth="repeat">
+      <a:schemeClr val="dk1"/>
+    </dgm:txFillClrLst>
+    <dgm:txEffectClrLst/>
+  </dgm:styleLbl>
+  <dgm:styleLbl name="solidBgAcc1">
+    <dgm:fillClrLst meth="repeat">
+      <a:schemeClr val="lt1"/>
+    </dgm:fillClrLst>
+    <dgm:linClrLst>
+      <a:schemeClr val="accent2"/>
+      <a:schemeClr val="accent3"/>
+    </dgm:linClrLst>
+    <dgm:effectClrLst/>
+    <dgm:txLinClrLst/>
+    <dgm:txFillClrLst meth="repeat">
+      <a:schemeClr val="dk1"/>
+    </dgm:txFillClrLst>
+    <dgm:txEffectClrLst/>
+  </dgm:styleLbl>
+  <dgm:styleLbl name="fgAccFollowNode1">
+    <dgm:fillClrLst>
+      <a:schemeClr val="accent2">
+        <a:tint val="40000"/>
+        <a:alpha val="90000"/>
+      </a:schemeClr>
+      <a:schemeClr val="accent3">
+        <a:tint val="40000"/>
+        <a:alpha val="90000"/>
+      </a:schemeClr>
+    </dgm:fillClrLst>
+    <dgm:linClrLst>
+      <a:schemeClr val="accent2">
+        <a:tint val="40000"/>
+        <a:alpha val="90000"/>
+      </a:schemeClr>
+      <a:schemeClr val="accent3">
+        <a:tint val="40000"/>
+        <a:alpha val="90000"/>
+      </a:schemeClr>
+    </dgm:linClrLst>
+    <dgm:effectClrLst/>
+    <dgm:txLinClrLst/>
+    <dgm:txFillClrLst meth="repeat">
+      <a:schemeClr val="dk1"/>
+    </dgm:txFillClrLst>
+    <dgm:txEffectClrLst/>
+  </dgm:styleLbl>
+  <dgm:styleLbl name="alignAccFollowNode1">
+    <dgm:fillClrLst>
+      <a:schemeClr val="accent2">
+        <a:tint val="40000"/>
+        <a:alpha val="90000"/>
+      </a:schemeClr>
+      <a:schemeClr val="accent3">
+        <a:tint val="40000"/>
+        <a:alpha val="90000"/>
+      </a:schemeClr>
+    </dgm:fillClrLst>
+    <dgm:linClrLst>
+      <a:schemeClr val="accent2">
+        <a:tint val="40000"/>
+        <a:alpha val="90000"/>
+      </a:schemeClr>
+      <a:schemeClr val="accent3">
+        <a:tint val="40000"/>
+        <a:alpha val="90000"/>
+      </a:schemeClr>
+    </dgm:linClrLst>
+    <dgm:effectClrLst/>
+    <dgm:txLinClrLst/>
+    <dgm:txFillClrLst meth="repeat">
+      <a:schemeClr val="dk1"/>
+    </dgm:txFillClrLst>
+    <dgm:txEffectClrLst/>
+  </dgm:styleLbl>
+  <dgm:styleLbl name="bgAccFollowNode1">
+    <dgm:fillClrLst>
+      <a:schemeClr val="accent2">
+        <a:tint val="40000"/>
+        <a:alpha val="90000"/>
+      </a:schemeClr>
+      <a:schemeClr val="accent3">
+        <a:tint val="40000"/>
+        <a:alpha val="90000"/>
+      </a:schemeClr>
+    </dgm:fillClrLst>
+    <dgm:linClrLst>
+      <a:schemeClr val="accent2">
+        <a:tint val="40000"/>
+        <a:alpha val="90000"/>
+      </a:schemeClr>
+      <a:schemeClr val="accent3">
+        <a:tint val="40000"/>
+        <a:alpha val="90000"/>
+      </a:schemeClr>
+    </dgm:linClrLst>
+    <dgm:effectClrLst/>
+    <dgm:txLinClrLst/>
+    <dgm:txFillClrLst meth="repeat">
+      <a:schemeClr val="dk1"/>
+    </dgm:txFillClrLst>
+    <dgm:txEffectClrLst/>
+  </dgm:styleLbl>
+  <dgm:styleLbl name="fgAcc0">
+    <dgm:fillClrLst meth="repeat">
+      <a:schemeClr val="lt1">
+        <a:alpha val="90000"/>
+      </a:schemeClr>
+    </dgm:fillClrLst>
+    <dgm:linClrLst>
+      <a:schemeClr val="accent1"/>
+    </dgm:linClrLst>
+    <dgm:effectClrLst/>
+    <dgm:txLinClrLst/>
+    <dgm:txFillClrLst meth="repeat">
+      <a:schemeClr val="dk1"/>
+    </dgm:txFillClrLst>
+    <dgm:txEffectClrLst/>
+  </dgm:styleLbl>
+  <dgm:styleLbl name="fgAcc2">
+    <dgm:fillClrLst meth="repeat">
+      <a:schemeClr val="lt1">
+        <a:alpha val="90000"/>
+      </a:schemeClr>
+    </dgm:fillClrLst>
+    <dgm:linClrLst>
+      <a:schemeClr val="accent3"/>
+    </dgm:linClrLst>
+    <dgm:effectClrLst/>
+    <dgm:txLinClrLst/>
+    <dgm:txFillClrLst meth="repeat">
+      <a:schemeClr val="dk1"/>
+    </dgm:txFillClrLst>
+    <dgm:txEffectClrLst/>
+  </dgm:styleLbl>
+  <dgm:styleLbl name="fgAcc3">
+    <dgm:fillClrLst meth="repeat">
+      <a:schemeClr val="lt1">
+        <a:alpha val="90000"/>
+      </a:schemeClr>
+    </dgm:fillClrLst>
+    <dgm:linClrLst>
+      <a:schemeClr val="accent4"/>
+    </dgm:linClrLst>
+    <dgm:effectClrLst/>
+    <dgm:txLinClrLst/>
+    <dgm:txFillClrLst meth="repeat">
+      <a:schemeClr val="dk1"/>
+    </dgm:txFillClrLst>
+    <dgm:txEffectClrLst/>
+  </dgm:styleLbl>
+  <dgm:styleLbl name="fgAcc4">
+    <dgm:fillClrLst meth="repeat">
+      <a:schemeClr val="lt1">
+        <a:alpha val="90000"/>
+      </a:schemeClr>
+    </dgm:fillClrLst>
+    <dgm:linClrLst>
+      <a:schemeClr val="accent5"/>
+    </dgm:linClrLst>
+    <dgm:effectClrLst/>
+    <dgm:txLinClrLst/>
+    <dgm:txFillClrLst meth="repeat">
+      <a:schemeClr val="dk1"/>
+    </dgm:txFillClrLst>
+    <dgm:txEffectClrLst/>
+  </dgm:styleLbl>
+  <dgm:styleLbl name="bgShp">
+    <dgm:fillClrLst meth="repeat">
+      <a:schemeClr val="accent2">
+        <a:tint val="40000"/>
+      </a:schemeClr>
+    </dgm:fillClrLst>
+    <dgm:linClrLst meth="repeat">
+      <a:schemeClr val="dk1"/>
+    </dgm:linClrLst>
+    <dgm:effectClrLst/>
+    <dgm:txLinClrLst/>
+    <dgm:txFillClrLst meth="repeat">
+      <a:schemeClr val="dk1"/>
+    </dgm:txFillClrLst>
+    <dgm:txEffectClrLst/>
+  </dgm:styleLbl>
+  <dgm:styleLbl name="dkBgShp">
+    <dgm:fillClrLst meth="repeat">
+      <a:schemeClr val="accent2">
+        <a:shade val="90000"/>
+      </a:schemeClr>
+    </dgm:fillClrLst>
+    <dgm:linClrLst meth="repeat">
+      <a:schemeClr val="dk1"/>
+    </dgm:linClrLst>
+    <dgm:effectClrLst/>
+    <dgm:txLinClrLst/>
+    <dgm:txFillClrLst meth="repeat">
+      <a:schemeClr val="lt1"/>
+    </dgm:txFillClrLst>
+    <dgm:txEffectClrLst/>
+  </dgm:styleLbl>
+  <dgm:styleLbl name="trBgShp">
+    <dgm:fillClrLst meth="repeat">
+      <a:schemeClr val="accent2">
+        <a:tint val="50000"/>
+        <a:alpha val="40000"/>
+      </a:schemeClr>
+    </dgm:fillClrLst>
+    <dgm:linClrLst meth="repeat">
+      <a:schemeClr val="accent2"/>
+    </dgm:linClrLst>
+    <dgm:effectClrLst/>
+    <dgm:txLinClrLst/>
+    <dgm:txFillClrLst meth="repeat">
+      <a:schemeClr val="lt1"/>
+    </dgm:txFillClrLst>
+    <dgm:txEffectClrLst/>
+  </dgm:styleLbl>
+  <dgm:styleLbl name="fgShp">
+    <dgm:fillClrLst meth="repeat">
+      <a:schemeClr val="accent2">
+        <a:tint val="40000"/>
+      </a:schemeClr>
+    </dgm:fillClrLst>
+    <dgm:linClrLst meth="repeat">
+      <a:schemeClr val="lt1"/>
+    </dgm:linClrLst>
+    <dgm:effectClrLst/>
+    <dgm:txLinClrLst/>
+    <dgm:txFillClrLst meth="repeat">
+      <a:schemeClr val="dk1"/>
+    </dgm:txFillClrLst>
+    <dgm:txEffectClrLst/>
+  </dgm:styleLbl>
+  <dgm:styleLbl name="revTx">
+    <dgm:fillClrLst meth="repeat">
+      <a:schemeClr val="lt1">
+        <a:alpha val="0"/>
+      </a:schemeClr>
+    </dgm:fillClrLst>
+    <dgm:linClrLst meth="repeat">
+      <a:schemeClr val="dk1">
+        <a:alpha val="0"/>
+      </a:schemeClr>
+    </dgm:linClrLst>
+    <dgm:effectClrLst/>
+    <dgm:txLinClrLst/>
+    <dgm:txFillClrLst meth="repeat">
+      <a:schemeClr val="tx1"/>
+    </dgm:txFillClrLst>
+    <dgm:txEffectClrLst/>
+  </dgm:styleLbl>
+</dgm:colorsDef>
+</file>
+
+<file path=ppt/diagrams/data1.xml><?xml version="1.0" encoding="utf-8"?>
+<dgm:dataModel xmlns:dgm="http://schemas.openxmlformats.org/drawingml/2006/diagram" xmlns:a="http://schemas.openxmlformats.org/drawingml/2006/main">
+  <dgm:ptLst>
+    <dgm:pt modelId="{270CF0CD-E397-4239-B1E6-08AA92797ABE}" type="doc">
+      <dgm:prSet loTypeId="urn:microsoft.com/office/officeart/2005/8/layout/hierarchy3" loCatId="hierarchy" qsTypeId="urn:microsoft.com/office/officeart/2005/8/quickstyle/simple1" qsCatId="simple" csTypeId="urn:microsoft.com/office/officeart/2005/8/colors/colorful2" csCatId="colorful"/>
+      <dgm:spPr/>
+      <dgm:t>
+        <a:bodyPr/>
+        <a:lstStyle/>
+        <a:p>
+          <a:endParaRPr lang="en-US"/>
+        </a:p>
+      </dgm:t>
+    </dgm:pt>
+    <dgm:pt modelId="{61CA73BC-1B80-44DC-B584-D1F34DB253BD}">
+      <dgm:prSet/>
+      <dgm:spPr/>
+      <dgm:t>
+        <a:bodyPr/>
+        <a:lstStyle/>
+        <a:p>
+          <a:r>
+            <a:rPr lang="da-DK"/>
+            <a:t>YourLocal API</a:t>
+          </a:r>
+          <a:endParaRPr lang="en-US"/>
+        </a:p>
+      </dgm:t>
+    </dgm:pt>
+    <dgm:pt modelId="{FB3D65F7-2512-4201-8033-03A23C17CAEC}" type="parTrans" cxnId="{4A4DA0EC-22F1-48E6-938D-513B53FC1CC8}">
+      <dgm:prSet/>
+      <dgm:spPr/>
+      <dgm:t>
+        <a:bodyPr/>
+        <a:lstStyle/>
+        <a:p>
+          <a:endParaRPr lang="en-US"/>
+        </a:p>
+      </dgm:t>
+    </dgm:pt>
+    <dgm:pt modelId="{20A0FF23-FEBE-4B75-9F21-A283D12192ED}" type="sibTrans" cxnId="{4A4DA0EC-22F1-48E6-938D-513B53FC1CC8}">
+      <dgm:prSet/>
+      <dgm:spPr/>
+      <dgm:t>
+        <a:bodyPr/>
+        <a:lstStyle/>
+        <a:p>
+          <a:endParaRPr lang="en-US"/>
+        </a:p>
+      </dgm:t>
+    </dgm:pt>
+    <dgm:pt modelId="{FC130FC3-1AD0-4B98-98F2-534136D44C48}">
+      <dgm:prSet/>
+      <dgm:spPr/>
+      <dgm:t>
+        <a:bodyPr/>
+        <a:lstStyle/>
+        <a:p>
+          <a:r>
+            <a:rPr lang="da-DK"/>
+            <a:t>TheNext API</a:t>
+          </a:r>
+          <a:endParaRPr lang="en-US"/>
+        </a:p>
+      </dgm:t>
+    </dgm:pt>
+    <dgm:pt modelId="{66A732E5-125D-413B-BE25-F37C2A6ACB58}" type="parTrans" cxnId="{934FD446-380C-419B-9840-421A9E97C795}">
+      <dgm:prSet/>
+      <dgm:spPr/>
+      <dgm:t>
+        <a:bodyPr/>
+        <a:lstStyle/>
+        <a:p>
+          <a:endParaRPr lang="en-US"/>
+        </a:p>
+      </dgm:t>
+    </dgm:pt>
+    <dgm:pt modelId="{417D9344-2B76-473B-AC98-5BE52ED6CF02}" type="sibTrans" cxnId="{934FD446-380C-419B-9840-421A9E97C795}">
+      <dgm:prSet/>
+      <dgm:spPr/>
+      <dgm:t>
+        <a:bodyPr/>
+        <a:lstStyle/>
+        <a:p>
+          <a:endParaRPr lang="en-US"/>
+        </a:p>
+      </dgm:t>
+    </dgm:pt>
+    <dgm:pt modelId="{47E9B2E0-92EB-422E-B8AA-08D90FCA41E0}">
+      <dgm:prSet/>
+      <dgm:spPr/>
+      <dgm:t>
+        <a:bodyPr/>
+        <a:lstStyle/>
+        <a:p>
+          <a:r>
+            <a:rPr lang="da-DK"/>
+            <a:t>Geolokation</a:t>
+          </a:r>
+          <a:endParaRPr lang="en-US"/>
+        </a:p>
+      </dgm:t>
+    </dgm:pt>
+    <dgm:pt modelId="{3BE7025C-4827-4C74-8FDA-07279B19A64C}" type="parTrans" cxnId="{331A1B75-0D63-4831-9F2B-BCDEA3D755F1}">
+      <dgm:prSet/>
+      <dgm:spPr/>
+      <dgm:t>
+        <a:bodyPr/>
+        <a:lstStyle/>
+        <a:p>
+          <a:endParaRPr lang="en-US"/>
+        </a:p>
+      </dgm:t>
+    </dgm:pt>
+    <dgm:pt modelId="{A0C4FDFF-5B09-4A81-8B71-BCF5C1E836B1}" type="sibTrans" cxnId="{331A1B75-0D63-4831-9F2B-BCDEA3D755F1}">
+      <dgm:prSet/>
+      <dgm:spPr/>
+      <dgm:t>
+        <a:bodyPr/>
+        <a:lstStyle/>
+        <a:p>
+          <a:endParaRPr lang="en-US"/>
+        </a:p>
+      </dgm:t>
+    </dgm:pt>
+    <dgm:pt modelId="{14DCC602-8CCF-4A03-83DF-29DF66D1C115}">
+      <dgm:prSet/>
+      <dgm:spPr/>
+      <dgm:t>
+        <a:bodyPr/>
+        <a:lstStyle/>
+        <a:p>
+          <a:r>
+            <a:rPr lang="da-DK"/>
+            <a:t>Misforståelse</a:t>
+          </a:r>
+          <a:endParaRPr lang="en-US"/>
+        </a:p>
+      </dgm:t>
+    </dgm:pt>
+    <dgm:pt modelId="{2E82CAD0-D3FE-4179-BAA1-9E3347482F43}" type="parTrans" cxnId="{93DF9946-1F9B-4AED-B2AB-D98D698EF499}">
+      <dgm:prSet/>
+      <dgm:spPr/>
+      <dgm:t>
+        <a:bodyPr/>
+        <a:lstStyle/>
+        <a:p>
+          <a:endParaRPr lang="en-US"/>
+        </a:p>
+      </dgm:t>
+    </dgm:pt>
+    <dgm:pt modelId="{89643F8A-8B90-4620-9E61-E0EE719CF0F1}" type="sibTrans" cxnId="{93DF9946-1F9B-4AED-B2AB-D98D698EF499}">
+      <dgm:prSet/>
+      <dgm:spPr/>
+      <dgm:t>
+        <a:bodyPr/>
+        <a:lstStyle/>
+        <a:p>
+          <a:endParaRPr lang="en-US"/>
+        </a:p>
+      </dgm:t>
+    </dgm:pt>
+    <dgm:pt modelId="{7E265D95-B496-43F4-87BF-E3C2F9D073C6}" type="pres">
+      <dgm:prSet presAssocID="{270CF0CD-E397-4239-B1E6-08AA92797ABE}" presName="diagram" presStyleCnt="0">
+        <dgm:presLayoutVars>
+          <dgm:chPref val="1"/>
+          <dgm:dir/>
+          <dgm:animOne val="branch"/>
+          <dgm:animLvl val="lvl"/>
+          <dgm:resizeHandles/>
+        </dgm:presLayoutVars>
+      </dgm:prSet>
+      <dgm:spPr/>
+    </dgm:pt>
+    <dgm:pt modelId="{4F581313-BAEB-4C29-B0EA-FFF821A70BE8}" type="pres">
+      <dgm:prSet presAssocID="{61CA73BC-1B80-44DC-B584-D1F34DB253BD}" presName="root" presStyleCnt="0"/>
+      <dgm:spPr/>
+    </dgm:pt>
+    <dgm:pt modelId="{F1F124B8-10E5-4DD6-A226-38B8E832BFF0}" type="pres">
+      <dgm:prSet presAssocID="{61CA73BC-1B80-44DC-B584-D1F34DB253BD}" presName="rootComposite" presStyleCnt="0"/>
+      <dgm:spPr/>
+    </dgm:pt>
+    <dgm:pt modelId="{C7FF03DB-D6B0-4795-9360-04D4FB05E7E0}" type="pres">
+      <dgm:prSet presAssocID="{61CA73BC-1B80-44DC-B584-D1F34DB253BD}" presName="rootText" presStyleLbl="node1" presStyleIdx="0" presStyleCnt="4"/>
+      <dgm:spPr/>
+    </dgm:pt>
+    <dgm:pt modelId="{F1F07B16-6905-4E2B-95DD-D6C4A850E4A7}" type="pres">
+      <dgm:prSet presAssocID="{61CA73BC-1B80-44DC-B584-D1F34DB253BD}" presName="rootConnector" presStyleLbl="node1" presStyleIdx="0" presStyleCnt="4"/>
+      <dgm:spPr/>
+    </dgm:pt>
+    <dgm:pt modelId="{806F0361-843F-408A-8C06-A812212EA5CC}" type="pres">
+      <dgm:prSet presAssocID="{61CA73BC-1B80-44DC-B584-D1F34DB253BD}" presName="childShape" presStyleCnt="0"/>
+      <dgm:spPr/>
+    </dgm:pt>
+    <dgm:pt modelId="{90BFE7E1-D0F2-44D7-A255-31AED003D39E}" type="pres">
+      <dgm:prSet presAssocID="{FC130FC3-1AD0-4B98-98F2-534136D44C48}" presName="root" presStyleCnt="0"/>
+      <dgm:spPr/>
+    </dgm:pt>
+    <dgm:pt modelId="{1DE9C85B-7785-4861-BD06-8BEC140D0507}" type="pres">
+      <dgm:prSet presAssocID="{FC130FC3-1AD0-4B98-98F2-534136D44C48}" presName="rootComposite" presStyleCnt="0"/>
+      <dgm:spPr/>
+    </dgm:pt>
+    <dgm:pt modelId="{F16C44AC-6514-491C-9DF5-B1C3200B3419}" type="pres">
+      <dgm:prSet presAssocID="{FC130FC3-1AD0-4B98-98F2-534136D44C48}" presName="rootText" presStyleLbl="node1" presStyleIdx="1" presStyleCnt="4"/>
+      <dgm:spPr/>
+    </dgm:pt>
+    <dgm:pt modelId="{DEE8A56A-EC43-4D4C-9C65-BC5507FD89B3}" type="pres">
+      <dgm:prSet presAssocID="{FC130FC3-1AD0-4B98-98F2-534136D44C48}" presName="rootConnector" presStyleLbl="node1" presStyleIdx="1" presStyleCnt="4"/>
+      <dgm:spPr/>
+    </dgm:pt>
+    <dgm:pt modelId="{563B0461-4137-452E-94E9-1536638EE81E}" type="pres">
+      <dgm:prSet presAssocID="{FC130FC3-1AD0-4B98-98F2-534136D44C48}" presName="childShape" presStyleCnt="0"/>
+      <dgm:spPr/>
+    </dgm:pt>
+    <dgm:pt modelId="{1D8DDD27-245B-4013-B2D3-65B092FF1DD8}" type="pres">
+      <dgm:prSet presAssocID="{47E9B2E0-92EB-422E-B8AA-08D90FCA41E0}" presName="root" presStyleCnt="0"/>
+      <dgm:spPr/>
+    </dgm:pt>
+    <dgm:pt modelId="{E5459BEB-887A-48D4-A2A4-405454F463C5}" type="pres">
+      <dgm:prSet presAssocID="{47E9B2E0-92EB-422E-B8AA-08D90FCA41E0}" presName="rootComposite" presStyleCnt="0"/>
+      <dgm:spPr/>
+    </dgm:pt>
+    <dgm:pt modelId="{6A3B1260-9790-483B-88B4-C3B94A56B45D}" type="pres">
+      <dgm:prSet presAssocID="{47E9B2E0-92EB-422E-B8AA-08D90FCA41E0}" presName="rootText" presStyleLbl="node1" presStyleIdx="2" presStyleCnt="4"/>
+      <dgm:spPr/>
+    </dgm:pt>
+    <dgm:pt modelId="{109AE558-1924-4F9A-B05D-50E5DE07A11A}" type="pres">
+      <dgm:prSet presAssocID="{47E9B2E0-92EB-422E-B8AA-08D90FCA41E0}" presName="rootConnector" presStyleLbl="node1" presStyleIdx="2" presStyleCnt="4"/>
+      <dgm:spPr/>
+    </dgm:pt>
+    <dgm:pt modelId="{83A84B02-F903-4E94-B942-830966A8CE34}" type="pres">
+      <dgm:prSet presAssocID="{47E9B2E0-92EB-422E-B8AA-08D90FCA41E0}" presName="childShape" presStyleCnt="0"/>
+      <dgm:spPr/>
+    </dgm:pt>
+    <dgm:pt modelId="{FF0D537F-E005-4C8A-A07C-E4E14815FEA9}" type="pres">
+      <dgm:prSet presAssocID="{14DCC602-8CCF-4A03-83DF-29DF66D1C115}" presName="root" presStyleCnt="0"/>
+      <dgm:spPr/>
+    </dgm:pt>
+    <dgm:pt modelId="{037F39C1-E09D-455E-B693-07CDF6927061}" type="pres">
+      <dgm:prSet presAssocID="{14DCC602-8CCF-4A03-83DF-29DF66D1C115}" presName="rootComposite" presStyleCnt="0"/>
+      <dgm:spPr/>
+    </dgm:pt>
+    <dgm:pt modelId="{3F30E104-4583-499F-9D43-74C7948411BB}" type="pres">
+      <dgm:prSet presAssocID="{14DCC602-8CCF-4A03-83DF-29DF66D1C115}" presName="rootText" presStyleLbl="node1" presStyleIdx="3" presStyleCnt="4"/>
+      <dgm:spPr/>
+    </dgm:pt>
+    <dgm:pt modelId="{378886B9-5D84-4B48-AF26-2DF4F5736FE6}" type="pres">
+      <dgm:prSet presAssocID="{14DCC602-8CCF-4A03-83DF-29DF66D1C115}" presName="rootConnector" presStyleLbl="node1" presStyleIdx="3" presStyleCnt="4"/>
+      <dgm:spPr/>
+    </dgm:pt>
+    <dgm:pt modelId="{FC9AF1F4-AAD4-4C9B-BA3A-7EBA4E396D10}" type="pres">
+      <dgm:prSet presAssocID="{14DCC602-8CCF-4A03-83DF-29DF66D1C115}" presName="childShape" presStyleCnt="0"/>
+      <dgm:spPr/>
+    </dgm:pt>
+  </dgm:ptLst>
+  <dgm:cxnLst>
+    <dgm:cxn modelId="{2835A40F-C5FC-4D1D-8C47-E87C8A5E85B3}" type="presOf" srcId="{FC130FC3-1AD0-4B98-98F2-534136D44C48}" destId="{F16C44AC-6514-491C-9DF5-B1C3200B3419}" srcOrd="0" destOrd="0" presId="urn:microsoft.com/office/officeart/2005/8/layout/hierarchy3"/>
+    <dgm:cxn modelId="{B0072D28-6390-4BD4-B01D-8FB622CA27A4}" type="presOf" srcId="{14DCC602-8CCF-4A03-83DF-29DF66D1C115}" destId="{3F30E104-4583-499F-9D43-74C7948411BB}" srcOrd="0" destOrd="0" presId="urn:microsoft.com/office/officeart/2005/8/layout/hierarchy3"/>
+    <dgm:cxn modelId="{A009872F-6BF2-4518-9964-8D05AB77AE71}" type="presOf" srcId="{61CA73BC-1B80-44DC-B584-D1F34DB253BD}" destId="{F1F07B16-6905-4E2B-95DD-D6C4A850E4A7}" srcOrd="1" destOrd="0" presId="urn:microsoft.com/office/officeart/2005/8/layout/hierarchy3"/>
+    <dgm:cxn modelId="{93DF9946-1F9B-4AED-B2AB-D98D698EF499}" srcId="{270CF0CD-E397-4239-B1E6-08AA92797ABE}" destId="{14DCC602-8CCF-4A03-83DF-29DF66D1C115}" srcOrd="3" destOrd="0" parTransId="{2E82CAD0-D3FE-4179-BAA1-9E3347482F43}" sibTransId="{89643F8A-8B90-4620-9E61-E0EE719CF0F1}"/>
+    <dgm:cxn modelId="{934FD446-380C-419B-9840-421A9E97C795}" srcId="{270CF0CD-E397-4239-B1E6-08AA92797ABE}" destId="{FC130FC3-1AD0-4B98-98F2-534136D44C48}" srcOrd="1" destOrd="0" parTransId="{66A732E5-125D-413B-BE25-F37C2A6ACB58}" sibTransId="{417D9344-2B76-473B-AC98-5BE52ED6CF02}"/>
+    <dgm:cxn modelId="{331A1B75-0D63-4831-9F2B-BCDEA3D755F1}" srcId="{270CF0CD-E397-4239-B1E6-08AA92797ABE}" destId="{47E9B2E0-92EB-422E-B8AA-08D90FCA41E0}" srcOrd="2" destOrd="0" parTransId="{3BE7025C-4827-4C74-8FDA-07279B19A64C}" sibTransId="{A0C4FDFF-5B09-4A81-8B71-BCF5C1E836B1}"/>
+    <dgm:cxn modelId="{1C0DAA77-B3A9-40C7-9D87-B3D1D0937EA5}" type="presOf" srcId="{14DCC602-8CCF-4A03-83DF-29DF66D1C115}" destId="{378886B9-5D84-4B48-AF26-2DF4F5736FE6}" srcOrd="1" destOrd="0" presId="urn:microsoft.com/office/officeart/2005/8/layout/hierarchy3"/>
+    <dgm:cxn modelId="{8A822E92-ACDD-421D-A60A-7B6AB1AFA0EF}" type="presOf" srcId="{270CF0CD-E397-4239-B1E6-08AA92797ABE}" destId="{7E265D95-B496-43F4-87BF-E3C2F9D073C6}" srcOrd="0" destOrd="0" presId="urn:microsoft.com/office/officeart/2005/8/layout/hierarchy3"/>
+    <dgm:cxn modelId="{C80F3CA9-B8A3-4436-83E4-4B73CEA69764}" type="presOf" srcId="{47E9B2E0-92EB-422E-B8AA-08D90FCA41E0}" destId="{6A3B1260-9790-483B-88B4-C3B94A56B45D}" srcOrd="0" destOrd="0" presId="urn:microsoft.com/office/officeart/2005/8/layout/hierarchy3"/>
+    <dgm:cxn modelId="{37D78AAE-1951-4354-AB16-DD032288B81A}" type="presOf" srcId="{47E9B2E0-92EB-422E-B8AA-08D90FCA41E0}" destId="{109AE558-1924-4F9A-B05D-50E5DE07A11A}" srcOrd="1" destOrd="0" presId="urn:microsoft.com/office/officeart/2005/8/layout/hierarchy3"/>
+    <dgm:cxn modelId="{2587DABE-B695-49BB-AA43-E48F6FE8AC4B}" type="presOf" srcId="{61CA73BC-1B80-44DC-B584-D1F34DB253BD}" destId="{C7FF03DB-D6B0-4795-9360-04D4FB05E7E0}" srcOrd="0" destOrd="0" presId="urn:microsoft.com/office/officeart/2005/8/layout/hierarchy3"/>
+    <dgm:cxn modelId="{4A4DA0EC-22F1-48E6-938D-513B53FC1CC8}" srcId="{270CF0CD-E397-4239-B1E6-08AA92797ABE}" destId="{61CA73BC-1B80-44DC-B584-D1F34DB253BD}" srcOrd="0" destOrd="0" parTransId="{FB3D65F7-2512-4201-8033-03A23C17CAEC}" sibTransId="{20A0FF23-FEBE-4B75-9F21-A283D12192ED}"/>
+    <dgm:cxn modelId="{D9A86AF4-F351-4678-8D2F-9DC64ABD52AD}" type="presOf" srcId="{FC130FC3-1AD0-4B98-98F2-534136D44C48}" destId="{DEE8A56A-EC43-4D4C-9C65-BC5507FD89B3}" srcOrd="1" destOrd="0" presId="urn:microsoft.com/office/officeart/2005/8/layout/hierarchy3"/>
+    <dgm:cxn modelId="{AFCF8AF1-CD14-4FE6-8304-62CB9ACD3652}" type="presParOf" srcId="{7E265D95-B496-43F4-87BF-E3C2F9D073C6}" destId="{4F581313-BAEB-4C29-B0EA-FFF821A70BE8}" srcOrd="0" destOrd="0" presId="urn:microsoft.com/office/officeart/2005/8/layout/hierarchy3"/>
+    <dgm:cxn modelId="{D0EB281A-5E76-47BA-889B-94351AA2084B}" type="presParOf" srcId="{4F581313-BAEB-4C29-B0EA-FFF821A70BE8}" destId="{F1F124B8-10E5-4DD6-A226-38B8E832BFF0}" srcOrd="0" destOrd="0" presId="urn:microsoft.com/office/officeart/2005/8/layout/hierarchy3"/>
+    <dgm:cxn modelId="{EB75F2C1-78B0-4662-885C-CEBF6D8D6519}" type="presParOf" srcId="{F1F124B8-10E5-4DD6-A226-38B8E832BFF0}" destId="{C7FF03DB-D6B0-4795-9360-04D4FB05E7E0}" srcOrd="0" destOrd="0" presId="urn:microsoft.com/office/officeart/2005/8/layout/hierarchy3"/>
+    <dgm:cxn modelId="{E1F01D46-49E9-4123-A652-2218102D88FE}" type="presParOf" srcId="{F1F124B8-10E5-4DD6-A226-38B8E832BFF0}" destId="{F1F07B16-6905-4E2B-95DD-D6C4A850E4A7}" srcOrd="1" destOrd="0" presId="urn:microsoft.com/office/officeart/2005/8/layout/hierarchy3"/>
+    <dgm:cxn modelId="{9B4F91C6-8562-42B7-823E-1412EB17BACB}" type="presParOf" srcId="{4F581313-BAEB-4C29-B0EA-FFF821A70BE8}" destId="{806F0361-843F-408A-8C06-A812212EA5CC}" srcOrd="1" destOrd="0" presId="urn:microsoft.com/office/officeart/2005/8/layout/hierarchy3"/>
+    <dgm:cxn modelId="{174A685D-660D-496D-AF8B-5FDB9BB67053}" type="presParOf" srcId="{7E265D95-B496-43F4-87BF-E3C2F9D073C6}" destId="{90BFE7E1-D0F2-44D7-A255-31AED003D39E}" srcOrd="1" destOrd="0" presId="urn:microsoft.com/office/officeart/2005/8/layout/hierarchy3"/>
+    <dgm:cxn modelId="{65A6C5BD-C543-41FD-A157-71AB6F1CBEFA}" type="presParOf" srcId="{90BFE7E1-D0F2-44D7-A255-31AED003D39E}" destId="{1DE9C85B-7785-4861-BD06-8BEC140D0507}" srcOrd="0" destOrd="0" presId="urn:microsoft.com/office/officeart/2005/8/layout/hierarchy3"/>
+    <dgm:cxn modelId="{7734D55F-FC6E-4DB6-B610-FB5BD6836AA9}" type="presParOf" srcId="{1DE9C85B-7785-4861-BD06-8BEC140D0507}" destId="{F16C44AC-6514-491C-9DF5-B1C3200B3419}" srcOrd="0" destOrd="0" presId="urn:microsoft.com/office/officeart/2005/8/layout/hierarchy3"/>
+    <dgm:cxn modelId="{B34F2D3A-C6B1-4E64-BFB8-75AB95894484}" type="presParOf" srcId="{1DE9C85B-7785-4861-BD06-8BEC140D0507}" destId="{DEE8A56A-EC43-4D4C-9C65-BC5507FD89B3}" srcOrd="1" destOrd="0" presId="urn:microsoft.com/office/officeart/2005/8/layout/hierarchy3"/>
+    <dgm:cxn modelId="{89D67E25-79C7-4D92-990A-7DDEF9405C59}" type="presParOf" srcId="{90BFE7E1-D0F2-44D7-A255-31AED003D39E}" destId="{563B0461-4137-452E-94E9-1536638EE81E}" srcOrd="1" destOrd="0" presId="urn:microsoft.com/office/officeart/2005/8/layout/hierarchy3"/>
+    <dgm:cxn modelId="{BE90B7CE-6B02-44FD-9053-4EED24073558}" type="presParOf" srcId="{7E265D95-B496-43F4-87BF-E3C2F9D073C6}" destId="{1D8DDD27-245B-4013-B2D3-65B092FF1DD8}" srcOrd="2" destOrd="0" presId="urn:microsoft.com/office/officeart/2005/8/layout/hierarchy3"/>
+    <dgm:cxn modelId="{421C8B19-AA80-4B8B-9D13-0E6B976B2CCD}" type="presParOf" srcId="{1D8DDD27-245B-4013-B2D3-65B092FF1DD8}" destId="{E5459BEB-887A-48D4-A2A4-405454F463C5}" srcOrd="0" destOrd="0" presId="urn:microsoft.com/office/officeart/2005/8/layout/hierarchy3"/>
+    <dgm:cxn modelId="{3952D7D7-970C-4EF2-A3A0-37DABFDDD6E7}" type="presParOf" srcId="{E5459BEB-887A-48D4-A2A4-405454F463C5}" destId="{6A3B1260-9790-483B-88B4-C3B94A56B45D}" srcOrd="0" destOrd="0" presId="urn:microsoft.com/office/officeart/2005/8/layout/hierarchy3"/>
+    <dgm:cxn modelId="{3E83B811-7D3A-4275-890A-A55025A27346}" type="presParOf" srcId="{E5459BEB-887A-48D4-A2A4-405454F463C5}" destId="{109AE558-1924-4F9A-B05D-50E5DE07A11A}" srcOrd="1" destOrd="0" presId="urn:microsoft.com/office/officeart/2005/8/layout/hierarchy3"/>
+    <dgm:cxn modelId="{315AB62B-32E1-44B3-92C7-8CFC0E491CB8}" type="presParOf" srcId="{1D8DDD27-245B-4013-B2D3-65B092FF1DD8}" destId="{83A84B02-F903-4E94-B942-830966A8CE34}" srcOrd="1" destOrd="0" presId="urn:microsoft.com/office/officeart/2005/8/layout/hierarchy3"/>
+    <dgm:cxn modelId="{9D3864C1-5982-445F-9D1F-87B069D4FC7D}" type="presParOf" srcId="{7E265D95-B496-43F4-87BF-E3C2F9D073C6}" destId="{FF0D537F-E005-4C8A-A07C-E4E14815FEA9}" srcOrd="3" destOrd="0" presId="urn:microsoft.com/office/officeart/2005/8/layout/hierarchy3"/>
+    <dgm:cxn modelId="{59A0FBDA-00BB-43F6-9A43-13DDA944F09D}" type="presParOf" srcId="{FF0D537F-E005-4C8A-A07C-E4E14815FEA9}" destId="{037F39C1-E09D-455E-B693-07CDF6927061}" srcOrd="0" destOrd="0" presId="urn:microsoft.com/office/officeart/2005/8/layout/hierarchy3"/>
+    <dgm:cxn modelId="{C1F56D08-494B-44ED-86CA-B8B5AE269366}" type="presParOf" srcId="{037F39C1-E09D-455E-B693-07CDF6927061}" destId="{3F30E104-4583-499F-9D43-74C7948411BB}" srcOrd="0" destOrd="0" presId="urn:microsoft.com/office/officeart/2005/8/layout/hierarchy3"/>
+    <dgm:cxn modelId="{5BE8F982-8879-44AC-A2CB-FCC7A9FAACFB}" type="presParOf" srcId="{037F39C1-E09D-455E-B693-07CDF6927061}" destId="{378886B9-5D84-4B48-AF26-2DF4F5736FE6}" srcOrd="1" destOrd="0" presId="urn:microsoft.com/office/officeart/2005/8/layout/hierarchy3"/>
+    <dgm:cxn modelId="{4609D42E-B811-4868-9942-44D5BE5513D3}" type="presParOf" srcId="{FF0D537F-E005-4C8A-A07C-E4E14815FEA9}" destId="{FC9AF1F4-AAD4-4C9B-BA3A-7EBA4E396D10}" srcOrd="1" destOrd="0" presId="urn:microsoft.com/office/officeart/2005/8/layout/hierarchy3"/>
+  </dgm:cxnLst>
+  <dgm:bg/>
+  <dgm:whole/>
+  <dgm:extLst>
+    <a:ext uri="http://schemas.microsoft.com/office/drawing/2008/diagram">
+      <dsp:dataModelExt xmlns:dsp="http://schemas.microsoft.com/office/drawing/2008/diagram" relId="rId6" minVer="http://schemas.openxmlformats.org/drawingml/2006/diagram"/>
+    </a:ext>
+  </dgm:extLst>
+</dgm:dataModel>
+</file>
+
+<file path=ppt/diagrams/drawing1.xml><?xml version="1.0" encoding="utf-8"?>
+<dsp:drawing xmlns:dgm="http://schemas.openxmlformats.org/drawingml/2006/diagram" xmlns:dsp="http://schemas.microsoft.com/office/drawing/2008/diagram" xmlns:a="http://schemas.openxmlformats.org/drawingml/2006/main">
+  <dsp:spTree>
+    <dsp:nvGrpSpPr>
+      <dsp:cNvPr id="0" name=""/>
+      <dsp:cNvGrpSpPr/>
+    </dsp:nvGrpSpPr>
+    <dsp:grpSpPr/>
+    <dsp:sp modelId="{C7FF03DB-D6B0-4795-9360-04D4FB05E7E0}">
+      <dsp:nvSpPr>
+        <dsp:cNvPr id="0" name=""/>
+        <dsp:cNvSpPr/>
+      </dsp:nvSpPr>
+      <dsp:spPr>
+        <a:xfrm>
+          <a:off x="2019" y="1258807"/>
+          <a:ext cx="2321244" cy="1160622"/>
+        </a:xfrm>
+        <a:prstGeom prst="roundRect">
+          <a:avLst>
+            <a:gd name="adj" fmla="val 10000"/>
+          </a:avLst>
+        </a:prstGeom>
+        <a:solidFill>
+          <a:schemeClr val="accent2">
+            <a:hueOff val="0"/>
+            <a:satOff val="0"/>
+            <a:lumOff val="0"/>
+            <a:alphaOff val="0"/>
+          </a:schemeClr>
+        </a:solidFill>
+        <a:ln w="22225" cap="rnd" cmpd="sng" algn="ctr">
+          <a:solidFill>
+            <a:schemeClr val="lt1">
+              <a:hueOff val="0"/>
+              <a:satOff val="0"/>
+              <a:lumOff val="0"/>
+              <a:alphaOff val="0"/>
+            </a:schemeClr>
+          </a:solidFill>
+          <a:prstDash val="solid"/>
+        </a:ln>
+        <a:effectLst/>
+      </dsp:spPr>
+      <dsp:style>
+        <a:lnRef idx="2">
+          <a:scrgbClr r="0" g="0" b="0"/>
+        </a:lnRef>
+        <a:fillRef idx="1">
+          <a:scrgbClr r="0" g="0" b="0"/>
+        </a:fillRef>
+        <a:effectRef idx="0">
+          <a:scrgbClr r="0" g="0" b="0"/>
+        </a:effectRef>
+        <a:fontRef idx="minor">
+          <a:schemeClr val="lt1"/>
+        </a:fontRef>
+      </dsp:style>
+      <dsp:txBody>
+        <a:bodyPr spcFirstLastPara="0" vert="horz" wrap="square" lIns="59055" tIns="39370" rIns="59055" bIns="39370" numCol="1" spcCol="1270" anchor="ctr" anchorCtr="0">
+          <a:noAutofit/>
+        </a:bodyPr>
+        <a:lstStyle/>
+        <a:p>
+          <a:pPr marL="0" lvl="0" indent="0" algn="ctr" defTabSz="1377950">
+            <a:lnSpc>
+              <a:spcPct val="90000"/>
+            </a:lnSpc>
+            <a:spcBef>
+              <a:spcPct val="0"/>
+            </a:spcBef>
+            <a:spcAft>
+              <a:spcPct val="35000"/>
+            </a:spcAft>
+            <a:buNone/>
+          </a:pPr>
+          <a:r>
+            <a:rPr lang="da-DK" sz="3100" kern="1200"/>
+            <a:t>YourLocal API</a:t>
+          </a:r>
+          <a:endParaRPr lang="en-US" sz="3100" kern="1200"/>
+        </a:p>
+      </dsp:txBody>
+      <dsp:txXfrm>
+        <a:off x="36012" y="1292800"/>
+        <a:ext cx="2253258" cy="1092636"/>
+      </dsp:txXfrm>
+    </dsp:sp>
+    <dsp:sp modelId="{F16C44AC-6514-491C-9DF5-B1C3200B3419}">
+      <dsp:nvSpPr>
+        <dsp:cNvPr id="0" name=""/>
+        <dsp:cNvSpPr/>
+      </dsp:nvSpPr>
+      <dsp:spPr>
+        <a:xfrm>
+          <a:off x="2903575" y="1258807"/>
+          <a:ext cx="2321244" cy="1160622"/>
+        </a:xfrm>
+        <a:prstGeom prst="roundRect">
+          <a:avLst>
+            <a:gd name="adj" fmla="val 10000"/>
+          </a:avLst>
+        </a:prstGeom>
+        <a:solidFill>
+          <a:schemeClr val="accent2">
+            <a:hueOff val="-294232"/>
+            <a:satOff val="1406"/>
+            <a:lumOff val="1961"/>
+            <a:alphaOff val="0"/>
+          </a:schemeClr>
+        </a:solidFill>
+        <a:ln w="22225" cap="rnd" cmpd="sng" algn="ctr">
+          <a:solidFill>
+            <a:schemeClr val="lt1">
+              <a:hueOff val="0"/>
+              <a:satOff val="0"/>
+              <a:lumOff val="0"/>
+              <a:alphaOff val="0"/>
+            </a:schemeClr>
+          </a:solidFill>
+          <a:prstDash val="solid"/>
+        </a:ln>
+        <a:effectLst/>
+      </dsp:spPr>
+      <dsp:style>
+        <a:lnRef idx="2">
+          <a:scrgbClr r="0" g="0" b="0"/>
+        </a:lnRef>
+        <a:fillRef idx="1">
+          <a:scrgbClr r="0" g="0" b="0"/>
+        </a:fillRef>
+        <a:effectRef idx="0">
+          <a:scrgbClr r="0" g="0" b="0"/>
+        </a:effectRef>
+        <a:fontRef idx="minor">
+          <a:schemeClr val="lt1"/>
+        </a:fontRef>
+      </dsp:style>
+      <dsp:txBody>
+        <a:bodyPr spcFirstLastPara="0" vert="horz" wrap="square" lIns="59055" tIns="39370" rIns="59055" bIns="39370" numCol="1" spcCol="1270" anchor="ctr" anchorCtr="0">
+          <a:noAutofit/>
+        </a:bodyPr>
+        <a:lstStyle/>
+        <a:p>
+          <a:pPr marL="0" lvl="0" indent="0" algn="ctr" defTabSz="1377950">
+            <a:lnSpc>
+              <a:spcPct val="90000"/>
+            </a:lnSpc>
+            <a:spcBef>
+              <a:spcPct val="0"/>
+            </a:spcBef>
+            <a:spcAft>
+              <a:spcPct val="35000"/>
+            </a:spcAft>
+            <a:buNone/>
+          </a:pPr>
+          <a:r>
+            <a:rPr lang="da-DK" sz="3100" kern="1200"/>
+            <a:t>TheNext API</a:t>
+          </a:r>
+          <a:endParaRPr lang="en-US" sz="3100" kern="1200"/>
+        </a:p>
+      </dsp:txBody>
+      <dsp:txXfrm>
+        <a:off x="2937568" y="1292800"/>
+        <a:ext cx="2253258" cy="1092636"/>
+      </dsp:txXfrm>
+    </dsp:sp>
+    <dsp:sp modelId="{6A3B1260-9790-483B-88B4-C3B94A56B45D}">
+      <dsp:nvSpPr>
+        <dsp:cNvPr id="0" name=""/>
+        <dsp:cNvSpPr/>
+      </dsp:nvSpPr>
+      <dsp:spPr>
+        <a:xfrm>
+          <a:off x="5805130" y="1258807"/>
+          <a:ext cx="2321244" cy="1160622"/>
+        </a:xfrm>
+        <a:prstGeom prst="roundRect">
+          <a:avLst>
+            <a:gd name="adj" fmla="val 10000"/>
+          </a:avLst>
+        </a:prstGeom>
+        <a:solidFill>
+          <a:schemeClr val="accent2">
+            <a:hueOff val="-588464"/>
+            <a:satOff val="2812"/>
+            <a:lumOff val="3922"/>
+            <a:alphaOff val="0"/>
+          </a:schemeClr>
+        </a:solidFill>
+        <a:ln w="22225" cap="rnd" cmpd="sng" algn="ctr">
+          <a:solidFill>
+            <a:schemeClr val="lt1">
+              <a:hueOff val="0"/>
+              <a:satOff val="0"/>
+              <a:lumOff val="0"/>
+              <a:alphaOff val="0"/>
+            </a:schemeClr>
+          </a:solidFill>
+          <a:prstDash val="solid"/>
+        </a:ln>
+        <a:effectLst/>
+      </dsp:spPr>
+      <dsp:style>
+        <a:lnRef idx="2">
+          <a:scrgbClr r="0" g="0" b="0"/>
+        </a:lnRef>
+        <a:fillRef idx="1">
+          <a:scrgbClr r="0" g="0" b="0"/>
+        </a:fillRef>
+        <a:effectRef idx="0">
+          <a:scrgbClr r="0" g="0" b="0"/>
+        </a:effectRef>
+        <a:fontRef idx="minor">
+          <a:schemeClr val="lt1"/>
+        </a:fontRef>
+      </dsp:style>
+      <dsp:txBody>
+        <a:bodyPr spcFirstLastPara="0" vert="horz" wrap="square" lIns="59055" tIns="39370" rIns="59055" bIns="39370" numCol="1" spcCol="1270" anchor="ctr" anchorCtr="0">
+          <a:noAutofit/>
+        </a:bodyPr>
+        <a:lstStyle/>
+        <a:p>
+          <a:pPr marL="0" lvl="0" indent="0" algn="ctr" defTabSz="1377950">
+            <a:lnSpc>
+              <a:spcPct val="90000"/>
+            </a:lnSpc>
+            <a:spcBef>
+              <a:spcPct val="0"/>
+            </a:spcBef>
+            <a:spcAft>
+              <a:spcPct val="35000"/>
+            </a:spcAft>
+            <a:buNone/>
+          </a:pPr>
+          <a:r>
+            <a:rPr lang="da-DK" sz="3100" kern="1200"/>
+            <a:t>Geolokation</a:t>
+          </a:r>
+          <a:endParaRPr lang="en-US" sz="3100" kern="1200"/>
+        </a:p>
+      </dsp:txBody>
+      <dsp:txXfrm>
+        <a:off x="5839123" y="1292800"/>
+        <a:ext cx="2253258" cy="1092636"/>
+      </dsp:txXfrm>
+    </dsp:sp>
+    <dsp:sp modelId="{3F30E104-4583-499F-9D43-74C7948411BB}">
+      <dsp:nvSpPr>
+        <dsp:cNvPr id="0" name=""/>
+        <dsp:cNvSpPr/>
+      </dsp:nvSpPr>
+      <dsp:spPr>
+        <a:xfrm>
+          <a:off x="8706685" y="1258807"/>
+          <a:ext cx="2321244" cy="1160622"/>
+        </a:xfrm>
+        <a:prstGeom prst="roundRect">
+          <a:avLst>
+            <a:gd name="adj" fmla="val 10000"/>
+          </a:avLst>
+        </a:prstGeom>
+        <a:solidFill>
+          <a:schemeClr val="accent2">
+            <a:hueOff val="-882696"/>
+            <a:satOff val="4218"/>
+            <a:lumOff val="5883"/>
+            <a:alphaOff val="0"/>
+          </a:schemeClr>
+        </a:solidFill>
+        <a:ln w="22225" cap="rnd" cmpd="sng" algn="ctr">
+          <a:solidFill>
+            <a:schemeClr val="lt1">
+              <a:hueOff val="0"/>
+              <a:satOff val="0"/>
+              <a:lumOff val="0"/>
+              <a:alphaOff val="0"/>
+            </a:schemeClr>
+          </a:solidFill>
+          <a:prstDash val="solid"/>
+        </a:ln>
+        <a:effectLst/>
+      </dsp:spPr>
+      <dsp:style>
+        <a:lnRef idx="2">
+          <a:scrgbClr r="0" g="0" b="0"/>
+        </a:lnRef>
+        <a:fillRef idx="1">
+          <a:scrgbClr r="0" g="0" b="0"/>
+        </a:fillRef>
+        <a:effectRef idx="0">
+          <a:scrgbClr r="0" g="0" b="0"/>
+        </a:effectRef>
+        <a:fontRef idx="minor">
+          <a:schemeClr val="lt1"/>
+        </a:fontRef>
+      </dsp:style>
+      <dsp:txBody>
+        <a:bodyPr spcFirstLastPara="0" vert="horz" wrap="square" lIns="59055" tIns="39370" rIns="59055" bIns="39370" numCol="1" spcCol="1270" anchor="ctr" anchorCtr="0">
+          <a:noAutofit/>
+        </a:bodyPr>
+        <a:lstStyle/>
+        <a:p>
+          <a:pPr marL="0" lvl="0" indent="0" algn="ctr" defTabSz="1377950">
+            <a:lnSpc>
+              <a:spcPct val="90000"/>
+            </a:lnSpc>
+            <a:spcBef>
+              <a:spcPct val="0"/>
+            </a:spcBef>
+            <a:spcAft>
+              <a:spcPct val="35000"/>
+            </a:spcAft>
+            <a:buNone/>
+          </a:pPr>
+          <a:r>
+            <a:rPr lang="da-DK" sz="3100" kern="1200"/>
+            <a:t>Misforståelse</a:t>
+          </a:r>
+          <a:endParaRPr lang="en-US" sz="3100" kern="1200"/>
+        </a:p>
+      </dsp:txBody>
+      <dsp:txXfrm>
+        <a:off x="8740678" y="1292800"/>
+        <a:ext cx="2253258" cy="1092636"/>
+      </dsp:txXfrm>
+    </dsp:sp>
+  </dsp:spTree>
+</dsp:drawing>
+</file>
+
+<file path=ppt/diagrams/layout1.xml><?xml version="1.0" encoding="utf-8"?>
+<dgm:layoutDef xmlns:dgm="http://schemas.openxmlformats.org/drawingml/2006/diagram" xmlns:a="http://schemas.openxmlformats.org/drawingml/2006/main" uniqueId="urn:microsoft.com/office/officeart/2005/8/layout/hierarchy3">
+  <dgm:title val=""/>
+  <dgm:desc val=""/>
+  <dgm:catLst>
+    <dgm:cat type="hierarchy" pri="7000"/>
+    <dgm:cat type="list" pri="23000"/>
+    <dgm:cat type="relationship" pri="15000"/>
+    <dgm:cat type="convert" pri="7000"/>
+  </dgm:catLst>
+  <dgm:sampData>
+    <dgm:dataModel>
+      <dgm:ptLst>
+        <dgm:pt modelId="0" type="doc"/>
+        <dgm:pt modelId="1">
+          <dgm:prSet phldr="1"/>
+        </dgm:pt>
+        <dgm:pt modelId="11">
+          <dgm:prSet phldr="1"/>
+        </dgm:pt>
+        <dgm:pt modelId="12">
+          <dgm:prSet phldr="1"/>
+        </dgm:pt>
+        <dgm:pt modelId="2">
+          <dgm:prSet phldr="1"/>
+        </dgm:pt>
+        <dgm:pt modelId="21">
+          <dgm:prSet phldr="1"/>
+        </dgm:pt>
+        <dgm:pt modelId="22">
+          <dgm:prSet phldr="1"/>
+        </dgm:pt>
+      </dgm:ptLst>
+      <dgm:cxnLst>
+        <dgm:cxn modelId="4" srcId="0" destId="1" srcOrd="0" destOrd="0"/>
+        <dgm:cxn modelId="5" srcId="1" destId="11" srcOrd="0" destOrd="0"/>
+        <dgm:cxn modelId="6" srcId="1" destId="12" srcOrd="1" destOrd="0"/>
+        <dgm:cxn modelId="7" srcId="0" destId="2" srcOrd="1" destOrd="0"/>
+        <dgm:cxn modelId="8" srcId="2" destId="21" srcOrd="0" destOrd="0"/>
+        <dgm:cxn modelId="9" srcId="2" destId="22" srcOrd="1" destOrd="0"/>
+      </dgm:cxnLst>
+      <dgm:bg/>
+      <dgm:whole/>
+    </dgm:dataModel>
+  </dgm:sampData>
+  <dgm:styleData>
+    <dgm:dataModel>
+      <dgm:ptLst>
+        <dgm:pt modelId="0" type="doc"/>
+        <dgm:pt modelId="1"/>
+        <dgm:pt modelId="11"/>
+        <dgm:pt modelId="2"/>
+        <dgm:pt modelId="21"/>
+      </dgm:ptLst>
+      <dgm:cxnLst>
+        <dgm:cxn modelId="4" srcId="0" destId="1" srcOrd="0" destOrd="0"/>
+        <dgm:cxn modelId="5" srcId="0" destId="2" srcOrd="1" destOrd="0"/>
+        <dgm:cxn modelId="13" srcId="1" destId="11" srcOrd="0" destOrd="0"/>
+        <dgm:cxn modelId="23" srcId="2" destId="21" srcOrd="0" destOrd="0"/>
+      </dgm:cxnLst>
+      <dgm:bg/>
+      <dgm:whole/>
+    </dgm:dataModel>
+  </dgm:styleData>
+  <dgm:clrData>
+    <dgm:dataModel>
+      <dgm:ptLst>
+        <dgm:pt modelId="0" type="doc"/>
+        <dgm:pt modelId="1"/>
+        <dgm:pt modelId="11"/>
+        <dgm:pt modelId="2"/>
+        <dgm:pt modelId="21"/>
+        <dgm:pt modelId="3"/>
+        <dgm:pt modelId="31"/>
+        <dgm:pt modelId="4"/>
+        <dgm:pt modelId="41"/>
+      </dgm:ptLst>
+      <dgm:cxnLst>
+        <dgm:cxn modelId="5" srcId="0" destId="1" srcOrd="0" destOrd="0"/>
+        <dgm:cxn modelId="6" srcId="0" destId="2" srcOrd="1" destOrd="0"/>
+        <dgm:cxn modelId="7" srcId="0" destId="3" srcOrd="2" destOrd="0"/>
+        <dgm:cxn modelId="8" srcId="0" destId="4" srcOrd="3" destOrd="0"/>
+        <dgm:cxn modelId="13" srcId="1" destId="11" srcOrd="0" destOrd="0"/>
+        <dgm:cxn modelId="23" srcId="2" destId="21" srcOrd="0" destOrd="0"/>
+        <dgm:cxn modelId="33" srcId="3" destId="31" srcOrd="0" destOrd="0"/>
+        <dgm:cxn modelId="43" srcId="4" destId="41" srcOrd="0" destOrd="0"/>
+      </dgm:cxnLst>
+      <dgm:bg/>
+      <dgm:whole/>
+    </dgm:dataModel>
+  </dgm:clrData>
+  <dgm:layoutNode name="diagram">
+    <dgm:varLst>
+      <dgm:chPref val="1"/>
+      <dgm:dir/>
+      <dgm:animOne val="branch"/>
+      <dgm:animLvl val="lvl"/>
+      <dgm:resizeHandles/>
+    </dgm:varLst>
+    <dgm:choose name="Name0">
+      <dgm:if name="Name1" func="var" arg="dir" op="equ" val="norm">
+        <dgm:alg type="hierChild">
+          <dgm:param type="linDir" val="fromL"/>
+        </dgm:alg>
+      </dgm:if>
+      <dgm:else name="Name2">
+        <dgm:alg type="hierChild">
+          <dgm:param type="linDir" val="fromR"/>
+        </dgm:alg>
+      </dgm:else>
+    </dgm:choose>
+    <dgm:shape xmlns:r="http://schemas.openxmlformats.org/officeDocument/2006/relationships" r:blip="">
+      <dgm:adjLst/>
+    </dgm:shape>
+    <dgm:presOf/>
+    <dgm:constrLst>
+      <dgm:constr type="primFontSz" for="des" forName="rootText" op="equ" val="65"/>
+      <dgm:constr type="primFontSz" for="des" forName="childText" op="equ" val="65"/>
+      <dgm:constr type="w" for="des" forName="rootComposite" refType="w"/>
+      <dgm:constr type="h" for="des" forName="rootComposite" refType="w" fact="0.5"/>
+      <dgm:constr type="w" for="des" forName="childText" refType="w" refFor="des" refForName="rootComposite" fact="0.8"/>
+      <dgm:constr type="h" for="des" forName="childText" refType="h" refFor="des" refForName="rootComposite"/>
+      <dgm:constr type="sibSp" refType="w" refFor="des" refForName="rootComposite" fact="0.25"/>
+      <dgm:constr type="sibSp" for="des" forName="childShape" refType="h" refFor="des" refForName="childText" fact="0.25"/>
+      <dgm:constr type="sp" for="des" forName="root" refType="h" refFor="des" refForName="childText" fact="0.25"/>
+    </dgm:constrLst>
+    <dgm:ruleLst/>
+    <dgm:forEach name="Name3" axis="ch">
+      <dgm:forEach name="Name4" axis="self" ptType="node" cnt="1">
+        <dgm:layoutNode name="root">
+          <dgm:choose name="Name5">
+            <dgm:if name="Name6" func="var" arg="dir" op="equ" val="norm">
+              <dgm:alg type="hierRoot">
+                <dgm:param type="hierAlign" val="tL"/>
+              </dgm:alg>
+            </dgm:if>
+            <dgm:else name="Name7">
+              <dgm:alg type="hierRoot">
+                <dgm:param type="hierAlign" val="tR"/>
+              </dgm:alg>
+            </dgm:else>
+          </dgm:choose>
+          <dgm:shape xmlns:r="http://schemas.openxmlformats.org/officeDocument/2006/relationships" r:blip="">
+            <dgm:adjLst/>
+          </dgm:shape>
+          <dgm:presOf/>
+          <dgm:constrLst>
+            <dgm:constr type="alignOff" val="0.2"/>
+          </dgm:constrLst>
+          <dgm:ruleLst/>
+          <dgm:layoutNode name="rootComposite">
+            <dgm:alg type="composite"/>
+            <dgm:shape xmlns:r="http://schemas.openxmlformats.org/officeDocument/2006/relationships" r:blip="">
+              <dgm:adjLst/>
+            </dgm:shape>
+            <dgm:presOf axis="self" ptType="node" cnt="1"/>
+            <dgm:choose name="Name8">
+              <dgm:if name="Name9" func="var" arg="dir" op="equ" val="norm">
+                <dgm:constrLst>
+                  <dgm:constr type="l" for="ch" forName="rootText"/>
+                  <dgm:constr type="t" for="ch" forName="rootText"/>
+                  <dgm:constr type="w" for="ch" forName="rootText" refType="w"/>
+                  <dgm:constr type="h" for="ch" forName="rootText" refType="h"/>
+                  <dgm:constr type="l" for="ch" forName="rootConnector"/>
+                  <dgm:constr type="t" for="ch" forName="rootConnector"/>
+                  <dgm:constr type="w" for="ch" forName="rootConnector" refType="w" refFor="ch" refForName="rootText" fact="0.2"/>
+                  <dgm:constr type="h" for="ch" forName="rootConnector" refType="h" refFor="ch" refForName="rootText"/>
+                </dgm:constrLst>
+              </dgm:if>
+              <dgm:else name="Name10">
+                <dgm:constrLst>
+                  <dgm:constr type="l" for="ch" forName="rootText"/>
+                  <dgm:constr type="t" for="ch" forName="rootText"/>
+                  <dgm:constr type="w" for="ch" forName="rootText" refType="w"/>
+                  <dgm:constr type="h" for="ch" forName="rootText" refType="h"/>
+                  <dgm:constr type="r" for="ch" forName="rootConnector" refType="w"/>
+                  <dgm:constr type="t" for="ch" forName="rootConnector"/>
+                  <dgm:constr type="w" for="ch" forName="rootConnector" refType="w" refFor="ch" refForName="rootText" fact="0.2"/>
+                  <dgm:constr type="h" for="ch" forName="rootConnector" refType="h" refFor="ch" refForName="rootText"/>
+                </dgm:constrLst>
+              </dgm:else>
+            </dgm:choose>
+            <dgm:ruleLst/>
+            <dgm:layoutNode name="rootText" styleLbl="node1">
+              <dgm:alg type="tx"/>
+              <dgm:shape xmlns:r="http://schemas.openxmlformats.org/officeDocument/2006/relationships" type="roundRect" r:blip="">
+                <dgm:adjLst>
+                  <dgm:adj idx="1" val="0.1"/>
+                </dgm:adjLst>
+              </dgm:shape>
+              <dgm:presOf axis="self" ptType="node" cnt="1"/>
+              <dgm:constrLst>
+                <dgm:constr type="tMarg" refType="primFontSz" fact="0.1"/>
+                <dgm:constr type="bMarg" refType="primFontSz" fact="0.1"/>
+                <dgm:constr type="lMarg" refType="primFontSz" fact="0.15"/>
+                <dgm:constr type="rMarg" refType="primFontSz" fact="0.15"/>
+              </dgm:constrLst>
+              <dgm:ruleLst>
+                <dgm:rule type="primFontSz" val="5" fact="NaN" max="NaN"/>
+              </dgm:ruleLst>
+            </dgm:layoutNode>
+            <dgm:layoutNode name="rootConnector" moveWith="rootText">
+              <dgm:alg type="sp"/>
+              <dgm:shape xmlns:r="http://schemas.openxmlformats.org/officeDocument/2006/relationships" type="roundRect" r:blip="" hideGeom="1">
+                <dgm:adjLst>
+                  <dgm:adj idx="1" val="0.1"/>
+                </dgm:adjLst>
+              </dgm:shape>
+              <dgm:presOf axis="self" ptType="node" cnt="1"/>
+              <dgm:constrLst/>
+              <dgm:ruleLst/>
+            </dgm:layoutNode>
+          </dgm:layoutNode>
+          <dgm:layoutNode name="childShape">
+            <dgm:alg type="hierChild">
+              <dgm:param type="chAlign" val="l"/>
+              <dgm:param type="linDir" val="fromT"/>
+            </dgm:alg>
+            <dgm:shape xmlns:r="http://schemas.openxmlformats.org/officeDocument/2006/relationships" r:blip="">
+              <dgm:adjLst/>
+            </dgm:shape>
+            <dgm:presOf/>
+            <dgm:constrLst/>
+            <dgm:ruleLst/>
+            <dgm:forEach name="Name11" axis="ch">
+              <dgm:forEach name="Name12" axis="self" ptType="parTrans" cnt="1">
+                <dgm:layoutNode name="Name13">
+                  <dgm:choose name="Name14">
+                    <dgm:if name="Name15" func="var" arg="dir" op="equ" val="norm">
+                      <dgm:alg type="conn">
+                        <dgm:param type="dim" val="1D"/>
+                        <dgm:param type="endSty" val="noArr"/>
+                        <dgm:param type="connRout" val="bend"/>
+                        <dgm:param type="srcNode" val="rootConnector"/>
+                        <dgm:param type="begPts" val="bCtr"/>
+                        <dgm:param type="endPts" val="midL"/>
+                      </dgm:alg>
+                    </dgm:if>
+                    <dgm:else name="Name16">
+                      <dgm:alg type="conn">
+                        <dgm:param type="dim" val="1D"/>
+                        <dgm:param type="endSty" val="noArr"/>
+                        <dgm:param type="connRout" val="bend"/>
+                        <dgm:param type="srcNode" val="rootConnector"/>
+                        <dgm:param type="begPts" val="bCtr"/>
+                        <dgm:param type="endPts" val="midR"/>
+                      </dgm:alg>
+                    </dgm:else>
+                  </dgm:choose>
+                  <dgm:shape xmlns:r="http://schemas.openxmlformats.org/officeDocument/2006/relationships" type="conn" r:blip="">
+                    <dgm:adjLst/>
+                  </dgm:shape>
+                  <dgm:presOf axis="self"/>
+                  <dgm:constrLst>
+                    <dgm:constr type="begPad"/>
+                    <dgm:constr type="endPad"/>
+                  </dgm:constrLst>
+                  <dgm:ruleLst/>
+                </dgm:layoutNode>
+              </dgm:forEach>
+              <dgm:forEach name="Name17" axis="self" ptType="node">
+                <dgm:layoutNode name="childText" styleLbl="bgAcc1">
+                  <dgm:varLst>
+                    <dgm:bulletEnabled val="1"/>
+                  </dgm:varLst>
+                  <dgm:alg type="tx"/>
+                  <dgm:shape xmlns:r="http://schemas.openxmlformats.org/officeDocument/2006/relationships" type="roundRect" r:blip="">
+                    <dgm:adjLst>
+                      <dgm:adj idx="1" val="0.1"/>
+                    </dgm:adjLst>
+                  </dgm:shape>
+                  <dgm:presOf axis="self desOrSelf" ptType="node node" st="1 1" cnt="1 0"/>
+                  <dgm:constrLst>
+                    <dgm:constr type="tMarg" refType="primFontSz" fact="0.1"/>
+                    <dgm:constr type="bMarg" refType="primFontSz" fact="0.1"/>
+                    <dgm:constr type="lMarg" refType="primFontSz" fact="0.15"/>
+                    <dgm:constr type="rMarg" refType="primFontSz" fact="0.15"/>
+                  </dgm:constrLst>
+                  <dgm:ruleLst>
+                    <dgm:rule type="primFontSz" val="5" fact="NaN" max="NaN"/>
+                  </dgm:ruleLst>
+                </dgm:layoutNode>
+              </dgm:forEach>
+            </dgm:forEach>
+          </dgm:layoutNode>
+        </dgm:layoutNode>
+      </dgm:forEach>
+    </dgm:forEach>
+  </dgm:layoutNode>
+</dgm:layoutDef>
+</file>
+
+<file path=ppt/diagrams/quickStyle1.xml><?xml version="1.0" encoding="utf-8"?>
+<dgm:styleDef xmlns:dgm="http://schemas.openxmlformats.org/drawingml/2006/diagram" xmlns:a="http://schemas.openxmlformats.org/drawingml/2006/main" uniqueId="urn:microsoft.com/office/officeart/2005/8/quickstyle/simple1">
+  <dgm:title val=""/>
+  <dgm:desc val=""/>
+  <dgm:catLst>
+    <dgm:cat type="simple" pri="10100"/>
+  </dgm:catLst>
+  <dgm:scene3d>
+    <a:camera prst="orthographicFront"/>
+    <a:lightRig rig="threePt" dir="t"/>
+  </dgm:scene3d>
+  <dgm:styleLbl name="node0">
+    <dgm:scene3d>
+      <a:camera prst="orthographicFront"/>
+      <a:lightRig rig="threePt" dir="t"/>
+    </dgm:scene3d>
+    <dgm:sp3d/>
+    <dgm:txPr/>
+    <dgm:style>
+      <a:lnRef idx="2">
+        <a:scrgbClr r="0" g="0" b="0"/>
+      </a:lnRef>
+      <a:fillRef idx="1">
+        <a:scrgbClr r="0" g="0" b="0"/>
+      </a:fillRef>
+      <a:effectRef idx="0">
+        <a:scrgbClr r="0" g="0" b="0"/>
+      </a:effectRef>
+      <a:fontRef idx="minor">
+        <a:schemeClr val="lt1"/>
+      </a:fontRef>
+    </dgm:style>
+  </dgm:styleLbl>
+  <dgm:styleLbl name="lnNode1">
+    <dgm:scene3d>
+      <a:camera prst="orthographicFront"/>
+      <a:lightRig rig="threePt" dir="t"/>
+    </dgm:scene3d>
+    <dgm:sp3d/>
+    <dgm:txPr/>
+    <dgm:style>
+      <a:lnRef idx="2">
+        <a:scrgbClr r="0" g="0" b="0"/>
+      </a:lnRef>
+      <a:fillRef idx="1">
+        <a:scrgbClr r="0" g="0" b="0"/>
+      </a:fillRef>
+      <a:effectRef idx="0">
+        <a:scrgbClr r="0" g="0" b="0"/>
+      </a:effectRef>
+      <a:fontRef idx="minor">
+        <a:schemeClr val="lt1"/>
+      </a:fontRef>
+    </dgm:style>
+  </dgm:styleLbl>
+  <dgm:styleLbl name="vennNode1">
+    <dgm:scene3d>
+      <a:camera prst="orthographicFront"/>
+      <a:lightRig rig="threePt" dir="t"/>
+    </dgm:scene3d>
+    <dgm:sp3d/>
+    <dgm:txPr/>
+    <dgm:style>
+      <a:lnRef idx="2">
+        <a:scrgbClr r="0" g="0" b="0"/>
+      </a:lnRef>
+      <a:fillRef idx="1">
+        <a:scrgbClr r="0" g="0" b="0"/>
+      </a:fillRef>
+      <a:effectRef idx="0">
+        <a:scrgbClr r="0" g="0" b="0"/>
+      </a:effectRef>
+      <a:fontRef idx="minor">
+        <a:schemeClr val="tx1"/>
+      </a:fontRef>
+    </dgm:style>
+  </dgm:styleLbl>
+  <dgm:styleLbl name="alignNode1">
+    <dgm:scene3d>
+      <a:camera prst="orthographicFront"/>
+      <a:lightRig rig="threePt" dir="t"/>
+    </dgm:scene3d>
+    <dgm:sp3d/>
+    <dgm:txPr/>
+    <dgm:style>
+      <a:lnRef idx="2">
+        <a:scrgbClr r="0" g="0" b="0"/>
+      </a:lnRef>
+      <a:fillRef idx="1">
+        <a:scrgbClr r="0" g="0" b="0"/>
+      </a:fillRef>
+      <a:effectRef idx="0">
+        <a:scrgbClr r="0" g="0" b="0"/>
+      </a:effectRef>
+      <a:fontRef idx="minor">
+        <a:schemeClr val="lt1"/>
+      </a:fontRef>
+    </dgm:style>
+  </dgm:styleLbl>
+  <dgm:styleLbl name="node1">
+    <dgm:scene3d>
+      <a:camera prst="orthographicFront"/>
+      <a:lightRig rig="threePt" dir="t"/>
+    </dgm:scene3d>
+    <dgm:sp3d/>
+    <dgm:txPr/>
+    <dgm:style>
+      <a:lnRef idx="2">
+        <a:scrgbClr r="0" g="0" b="0"/>
+      </a:lnRef>
+      <a:fillRef idx="1">
+        <a:scrgbClr r="0" g="0" b="0"/>
+      </a:fillRef>
+      <a:effectRef idx="0">
+        <a:scrgbClr r="0" g="0" b="0"/>
+      </a:effectRef>
+      <a:fontRef idx="minor">
+        <a:schemeClr val="lt1"/>
+      </a:fontRef>
+    </dgm:style>
+  </dgm:styleLbl>
+  <dgm:styleLbl name="node2">
+    <dgm:scene3d>
+      <a:camera prst="orthographicFront"/>
+      <a:lightRig rig="threePt" dir="t"/>
+    </dgm:scene3d>
+    <dgm:sp3d/>
+    <dgm:txPr/>
+    <dgm:style>
+      <a:lnRef idx="2">
+        <a:scrgbClr r="0" g="0" b="0"/>
+      </a:lnRef>
+      <a:fillRef idx="1">
+        <a:scrgbClr r="0" g="0" b="0"/>
+      </a:fillRef>
+      <a:effectRef idx="0">
+        <a:scrgbClr r="0" g="0" b="0"/>
+      </a:effectRef>
+      <a:fontRef idx="minor">
+        <a:schemeClr val="lt1"/>
+      </a:fontRef>
+    </dgm:style>
+  </dgm:styleLbl>
+  <dgm:styleLbl name="node3">
+    <dgm:scene3d>
+      <a:camera prst="orthographicFront"/>
+      <a:lightRig rig="threePt" dir="t"/>
+    </dgm:scene3d>
+    <dgm:sp3d/>
+    <dgm:txPr/>
+    <dgm:style>
+      <a:lnRef idx="2">
+        <a:scrgbClr r="0" g="0" b="0"/>
+      </a:lnRef>
+      <a:fillRef idx="1">
+        <a:scrgbClr r="0" g="0" b="0"/>
+      </a:fillRef>
+      <a:effectRef idx="0">
+        <a:scrgbClr r="0" g="0" b="0"/>
+      </a:effectRef>
+      <a:fontRef idx="minor">
+        <a:schemeClr val="lt1"/>
+      </a:fontRef>
+    </dgm:style>
+  </dgm:styleLbl>
+  <dgm:styleLbl name="node4">
+    <dgm:scene3d>
+      <a:camera prst="orthographicFront"/>
+      <a:lightRig rig="threePt" dir="t"/>
+    </dgm:scene3d>
+    <dgm:sp3d/>
+    <dgm:txPr/>
+    <dgm:style>
+      <a:lnRef idx="2">
+        <a:scrgbClr r="0" g="0" b="0"/>
+      </a:lnRef>
+      <a:fillRef idx="1">
+        <a:scrgbClr r="0" g="0" b="0"/>
+      </a:fillRef>
+      <a:effectRef idx="0">
+        <a:scrgbClr r="0" g="0" b="0"/>
+      </a:effectRef>
+      <a:fontRef idx="minor">
+        <a:schemeClr val="lt1"/>
+      </a:fontRef>
+    </dgm:style>
+  </dgm:styleLbl>
+  <dgm:styleLbl name="fgImgPlace1">
+    <dgm:scene3d>
+      <a:camera prst="orthographicFront"/>
+      <a:lightRig rig="threePt" dir="t"/>
+    </dgm:scene3d>
+    <dgm:sp3d/>
+    <dgm:txPr/>
+    <dgm:style>
+      <a:lnRef idx="2">
+        <a:scrgbClr r="0" g="0" b="0"/>
+      </a:lnRef>
+      <a:fillRef idx="1">
+        <a:scrgbClr r="0" g="0" b="0"/>
+      </a:fillRef>
+      <a:effectRef idx="0">
+        <a:scrgbClr r="0" g="0" b="0"/>
+      </a:effectRef>
+      <a:fontRef idx="minor"/>
+    </dgm:style>
+  </dgm:styleLbl>
+  <dgm:styleLbl name="alignImgPlace1">
+    <dgm:scene3d>
+      <a:camera prst="orthographicFront"/>
+      <a:lightRig rig="threePt" dir="t"/>
+    </dgm:scene3d>
+    <dgm:sp3d/>
+    <dgm:txPr/>
+    <dgm:style>
+      <a:lnRef idx="2">
+        <a:scrgbClr r="0" g="0" b="0"/>
+      </a:lnRef>
+      <a:fillRef idx="1">
+        <a:scrgbClr r="0" g="0" b="0"/>
+      </a:fillRef>
+      <a:effectRef idx="0">
+        <a:scrgbClr r="0" g="0" b="0"/>
+      </a:effectRef>
+      <a:fontRef idx="minor"/>
+    </dgm:style>
+  </dgm:styleLbl>
+  <dgm:styleLbl name="bgImgPlace1">
+    <dgm:scene3d>
+      <a:camera prst="orthographicFront"/>
+      <a:lightRig rig="threePt" dir="t"/>
+    </dgm:scene3d>
+    <dgm:sp3d/>
+    <dgm:txPr/>
+    <dgm:style>
+      <a:lnRef idx="2">
+        <a:scrgbClr r="0" g="0" b="0"/>
+      </a:lnRef>
+      <a:fillRef idx="1">
+        <a:scrgbClr r="0" g="0" b="0"/>
+      </a:fillRef>
+      <a:effectRef idx="0">
+        <a:scrgbClr r="0" g="0" b="0"/>
+      </a:effectRef>
+      <a:fontRef idx="minor"/>
+    </dgm:style>
+  </dgm:styleLbl>
+  <dgm:styleLbl name="sibTrans2D1">
+    <dgm:scene3d>
+      <a:camera prst="orthographicFront"/>
+      <a:lightRig rig="threePt" dir="t"/>
+    </dgm:scene3d>
+    <dgm:sp3d/>
+    <dgm:txPr/>
+    <dgm:style>
+      <a:lnRef idx="0">
+        <a:scrgbClr r="0" g="0" b="0"/>
+      </a:lnRef>
+      <a:fillRef idx="1">
+        <a:scrgbClr r="0" g="0" b="0"/>
+      </a:fillRef>
+      <a:effectRef idx="0">
+        <a:scrgbClr r="0" g="0" b="0"/>
+      </a:effectRef>
+      <a:fontRef idx="minor">
+        <a:schemeClr val="lt1"/>
+      </a:fontRef>
+    </dgm:style>
+  </dgm:styleLbl>
+  <dgm:styleLbl name="fgSibTrans2D1">
+    <dgm:scene3d>
+      <a:camera prst="orthographicFront"/>
+      <a:lightRig rig="threePt" dir="t"/>
+    </dgm:scene3d>
+    <dgm:sp3d/>
+    <dgm:txPr/>
+    <dgm:style>
+      <a:lnRef idx="0">
+        <a:scrgbClr r="0" g="0" b="0"/>
+      </a:lnRef>
+      <a:fillRef idx="1">
+        <a:scrgbClr r="0" g="0" b="0"/>
+      </a:fillRef>
+      <a:effectRef idx="0">
+        <a:scrgbClr r="0" g="0" b="0"/>
+      </a:effectRef>
+      <a:fontRef idx="minor">
+        <a:schemeClr val="lt1"/>
+      </a:fontRef>
+    </dgm:style>
+  </dgm:styleLbl>
+  <dgm:styleLbl name="bgSibTrans2D1">
+    <dgm:scene3d>
+      <a:camera prst="orthographicFront"/>
+      <a:lightRig rig="threePt" dir="t"/>
+    </dgm:scene3d>
+    <dgm:sp3d/>
+    <dgm:txPr/>
+    <dgm:style>
+      <a:lnRef idx="0">
+        <a:scrgbClr r="0" g="0" b="0"/>
+      </a:lnRef>
+      <a:fillRef idx="1">
+        <a:scrgbClr r="0" g="0" b="0"/>
+      </a:fillRef>
+      <a:effectRef idx="0">
+        <a:scrgbClr r="0" g="0" b="0"/>
+      </a:effectRef>
+      <a:fontRef idx="minor">
+        <a:schemeClr val="lt1"/>
+      </a:fontRef>
+    </dgm:style>
+  </dgm:styleLbl>
+  <dgm:styleLbl name="sibTrans1D1">
+    <dgm:scene3d>
+      <a:camera prst="orthographicFront"/>
+      <a:lightRig rig="threePt" dir="t"/>
+    </dgm:scene3d>
+    <dgm:sp3d/>
+    <dgm:txPr/>
+    <dgm:style>
+      <a:lnRef idx="1">
+        <a:scrgbClr r="0" g="0" b="0"/>
+      </a:lnRef>
+      <a:fillRef idx="0">
+        <a:scrgbClr r="0" g="0" b="0"/>
+      </a:fillRef>
+      <a:effectRef idx="0">
+        <a:scrgbClr r="0" g="0" b="0"/>
+      </a:effectRef>
+      <a:fontRef idx="minor"/>
+    </dgm:style>
+  </dgm:styleLbl>
+  <dgm:styleLbl name="callout">
+    <dgm:scene3d>
+      <a:camera prst="orthographicFront"/>
+      <a:lightRig rig="threePt" dir="t"/>
+    </dgm:scene3d>
+    <dgm:sp3d/>
+    <dgm:txPr/>
+    <dgm:style>
+      <a:lnRef idx="2">
+        <a:scrgbClr r="0" g="0" b="0"/>
+      </a:lnRef>
+      <a:fillRef idx="1">
+        <a:scrgbClr r="0" g="0" b="0"/>
+      </a:fillRef>
+      <a:effectRef idx="0">
+        <a:scrgbClr r="0" g="0" b="0"/>
+      </a:effectRef>
+      <a:fontRef idx="minor"/>
+    </dgm:style>
+  </dgm:styleLbl>
+  <dgm:styleLbl name="asst0">
+    <dgm:scene3d>
+      <a:camera prst="orthographicFront"/>
+      <a:lightRig rig="threePt" dir="t"/>
+    </dgm:scene3d>
+    <dgm:sp3d/>
+    <dgm:txPr/>
+    <dgm:style>
+      <a:lnRef idx="2">
+        <a:scrgbClr r="0" g="0" b="0"/>
+      </a:lnRef>
+      <a:fillRef idx="1">
+        <a:scrgbClr r="0" g="0" b="0"/>
+      </a:fillRef>
+      <a:effectRef idx="0">
+        <a:scrgbClr r="0" g="0" b="0"/>
+      </a:effectRef>
+      <a:fontRef idx="minor">
+        <a:schemeClr val="lt1"/>
+      </a:fontRef>
+    </dgm:style>
+  </dgm:styleLbl>
+  <dgm:styleLbl name="asst1">
+    <dgm:scene3d>
+      <a:camera prst="orthographicFront"/>
+      <a:lightRig rig="threePt" dir="t"/>
+    </dgm:scene3d>
+    <dgm:sp3d/>
+    <dgm:txPr/>
+    <dgm:style>
+      <a:lnRef idx="2">
+        <a:scrgbClr r="0" g="0" b="0"/>
+      </a:lnRef>
+      <a:fillRef idx="1">
+        <a:scrgbClr r="0" g="0" b="0"/>
+      </a:fillRef>
+      <a:effectRef idx="0">
+        <a:scrgbClr r="0" g="0" b="0"/>
+      </a:effectRef>
+      <a:fontRef idx="minor">
+        <a:schemeClr val="lt1"/>
+      </a:fontRef>
+    </dgm:style>
+  </dgm:styleLbl>
+  <dgm:styleLbl name="asst2">
+    <dgm:scene3d>
+      <a:camera prst="orthographicFront"/>
+      <a:lightRig rig="threePt" dir="t"/>
+    </dgm:scene3d>
+    <dgm:sp3d/>
+    <dgm:txPr/>
+    <dgm:style>
+      <a:lnRef idx="2">
+        <a:scrgbClr r="0" g="0" b="0"/>
+      </a:lnRef>
+      <a:fillRef idx="1">
+        <a:scrgbClr r="0" g="0" b="0"/>
+      </a:fillRef>
+      <a:effectRef idx="0">
+        <a:scrgbClr r="0" g="0" b="0"/>
+      </a:effectRef>
+      <a:fontRef idx="minor">
+        <a:schemeClr val="lt1"/>
+      </a:fontRef>
+    </dgm:style>
+  </dgm:styleLbl>
+  <dgm:styleLbl name="asst3">
+    <dgm:scene3d>
+      <a:camera prst="orthographicFront"/>
+      <a:lightRig rig="threePt" dir="t"/>
+    </dgm:scene3d>
+    <dgm:sp3d/>
+    <dgm:txPr/>
+    <dgm:style>
+      <a:lnRef idx="2">
+        <a:scrgbClr r="0" g="0" b="0"/>
+      </a:lnRef>
+      <a:fillRef idx="1">
+        <a:scrgbClr r="0" g="0" b="0"/>
+      </a:fillRef>
+      <a:effectRef idx="0">
+        <a:scrgbClr r="0" g="0" b="0"/>
+      </a:effectRef>
+      <a:fontRef idx="minor">
+        <a:schemeClr val="lt1"/>
+      </a:fontRef>
+    </dgm:style>
+  </dgm:styleLbl>
+  <dgm:styleLbl name="asst4">
+    <dgm:scene3d>
+      <a:camera prst="orthographicFront"/>
+      <a:lightRig rig="threePt" dir="t"/>
+    </dgm:scene3d>
+    <dgm:sp3d/>
+    <dgm:txPr/>
+    <dgm:style>
+      <a:lnRef idx="2">
+        <a:scrgbClr r="0" g="0" b="0"/>
+      </a:lnRef>
+      <a:fillRef idx="1">
+        <a:scrgbClr r="0" g="0" b="0"/>
+      </a:fillRef>
+      <a:effectRef idx="0">
+        <a:scrgbClr r="0" g="0" b="0"/>
+      </a:effectRef>
+      <a:fontRef idx="minor">
+        <a:schemeClr val="lt1"/>
+      </a:fontRef>
+    </dgm:style>
+  </dgm:styleLbl>
+  <dgm:styleLbl name="parChTrans2D1">
+    <dgm:scene3d>
+      <a:camera prst="orthographicFront"/>
+      <a:lightRig rig="threePt" dir="t"/>
+    </dgm:scene3d>
+    <dgm:sp3d/>
+    <dgm:txPr/>
+    <dgm:style>
+      <a:lnRef idx="2">
+        <a:scrgbClr r="0" g="0" b="0"/>
+      </a:lnRef>
+      <a:fillRef idx="1">
+        <a:scrgbClr r="0" g="0" b="0"/>
+      </a:fillRef>
+      <a:effectRef idx="0">
+        <a:scrgbClr r="0" g="0" b="0"/>
+      </a:effectRef>
+      <a:fontRef idx="minor">
+        <a:schemeClr val="lt1"/>
+      </a:fontRef>
+    </dgm:style>
+  </dgm:styleLbl>
+  <dgm:styleLbl name="parChTrans2D2">
+    <dgm:scene3d>
+      <a:camera prst="orthographicFront"/>
+      <a:lightRig rig="threePt" dir="t"/>
+    </dgm:scene3d>
+    <dgm:sp3d/>
+    <dgm:txPr/>
+    <dgm:style>
+      <a:lnRef idx="2">
+        <a:scrgbClr r="0" g="0" b="0"/>
+      </a:lnRef>
+      <a:fillRef idx="1">
+        <a:scrgbClr r="0" g="0" b="0"/>
+      </a:fillRef>
+      <a:effectRef idx="0">
+        <a:scrgbClr r="0" g="0" b="0"/>
+      </a:effectRef>
+      <a:fontRef idx="minor">
+        <a:schemeClr val="lt1"/>
+      </a:fontRef>
+    </dgm:style>
+  </dgm:styleLbl>
+  <dgm:styleLbl name="parChTrans2D3">
+    <dgm:scene3d>
+      <a:camera prst="orthographicFront"/>
+      <a:lightRig rig="threePt" dir="t"/>
+    </dgm:scene3d>
+    <dgm:sp3d/>
+    <dgm:txPr/>
+    <dgm:style>
+      <a:lnRef idx="2">
+        <a:scrgbClr r="0" g="0" b="0"/>
+      </a:lnRef>
+      <a:fillRef idx="1">
+        <a:scrgbClr r="0" g="0" b="0"/>
+      </a:fillRef>
+      <a:effectRef idx="0">
+        <a:scrgbClr r="0" g="0" b="0"/>
+      </a:effectRef>
+      <a:fontRef idx="minor">
+        <a:schemeClr val="lt1"/>
+      </a:fontRef>
+    </dgm:style>
+  </dgm:styleLbl>
+  <dgm:styleLbl name="parChTrans2D4">
+    <dgm:scene3d>
+      <a:camera prst="orthographicFront"/>
+      <a:lightRig rig="threePt" dir="t"/>
+    </dgm:scene3d>
+    <dgm:sp3d/>
+    <dgm:txPr/>
+    <dgm:style>
+      <a:lnRef idx="2">
+        <a:scrgbClr r="0" g="0" b="0"/>
+      </a:lnRef>
+      <a:fillRef idx="1">
+        <a:scrgbClr r="0" g="0" b="0"/>
+      </a:fillRef>
+      <a:effectRef idx="0">
+        <a:scrgbClr r="0" g="0" b="0"/>
+      </a:effectRef>
+      <a:fontRef idx="minor">
+        <a:schemeClr val="lt1"/>
+      </a:fontRef>
+    </dgm:style>
+  </dgm:styleLbl>
+  <dgm:styleLbl name="parChTrans1D1">
+    <dgm:scene3d>
+      <a:camera prst="orthographicFront"/>
+      <a:lightRig rig="threePt" dir="t"/>
+    </dgm:scene3d>
+    <dgm:sp3d/>
+    <dgm:txPr/>
+    <dgm:style>
+      <a:lnRef idx="2">
+        <a:scrgbClr r="0" g="0" b="0"/>
+      </a:lnRef>
+      <a:fillRef idx="0">
+        <a:scrgbClr r="0" g="0" b="0"/>
+      </a:fillRef>
+      <a:effectRef idx="0">
+        <a:scrgbClr r="0" g="0" b="0"/>
+      </a:effectRef>
+      <a:fontRef idx="minor"/>
+    </dgm:style>
+  </dgm:styleLbl>
+  <dgm:styleLbl name="parChTrans1D2">
+    <dgm:scene3d>
+      <a:camera prst="orthographicFront"/>
+      <a:lightRig rig="threePt" dir="t"/>
+    </dgm:scene3d>
+    <dgm:sp3d/>
+    <dgm:txPr/>
+    <dgm:style>
+      <a:lnRef idx="2">
+        <a:scrgbClr r="0" g="0" b="0"/>
+      </a:lnRef>
+      <a:fillRef idx="0">
+        <a:scrgbClr r="0" g="0" b="0"/>
+      </a:fillRef>
+      <a:effectRef idx="0">
+        <a:scrgbClr r="0" g="0" b="0"/>
+      </a:effectRef>
+      <a:fontRef idx="minor"/>
+    </dgm:style>
+  </dgm:styleLbl>
+  <dgm:styleLbl name="parChTrans1D3">
+    <dgm:scene3d>
+      <a:camera prst="orthographicFront"/>
+      <a:lightRig rig="threePt" dir="t"/>
+    </dgm:scene3d>
+    <dgm:sp3d/>
+    <dgm:txPr/>
+    <dgm:style>
+      <a:lnRef idx="2">
+        <a:scrgbClr r="0" g="0" b="0"/>
+      </a:lnRef>
+      <a:fillRef idx="0">
+        <a:scrgbClr r="0" g="0" b="0"/>
+      </a:fillRef>
+      <a:effectRef idx="0">
+        <a:scrgbClr r="0" g="0" b="0"/>
+      </a:effectRef>
+      <a:fontRef idx="minor"/>
+    </dgm:style>
+  </dgm:styleLbl>
+  <dgm:styleLbl name="parChTrans1D4">
+    <dgm:scene3d>
+      <a:camera prst="orthographicFront"/>
+      <a:lightRig rig="threePt" dir="t"/>
+    </dgm:scene3d>
+    <dgm:sp3d/>
+    <dgm:txPr/>
+    <dgm:style>
+      <a:lnRef idx="2">
+        <a:scrgbClr r="0" g="0" b="0"/>
+      </a:lnRef>
+      <a:fillRef idx="0">
+        <a:scrgbClr r="0" g="0" b="0"/>
+      </a:fillRef>
+      <a:effectRef idx="0">
+        <a:scrgbClr r="0" g="0" b="0"/>
+      </a:effectRef>
+      <a:fontRef idx="minor"/>
+    </dgm:style>
+  </dgm:styleLbl>
+  <dgm:styleLbl name="fgAcc1">
+    <dgm:scene3d>
+      <a:camera prst="orthographicFront"/>
+      <a:lightRig rig="threePt" dir="t"/>
+    </dgm:scene3d>
+    <dgm:sp3d/>
+    <dgm:txPr/>
+    <dgm:style>
+      <a:lnRef idx="2">
+        <a:scrgbClr r="0" g="0" b="0"/>
+      </a:lnRef>
+      <a:fillRef idx="1">
+        <a:scrgbClr r="0" g="0" b="0"/>
+      </a:fillRef>
+      <a:effectRef idx="0">
+        <a:scrgbClr r="0" g="0" b="0"/>
+      </a:effectRef>
+      <a:fontRef idx="minor"/>
+    </dgm:style>
+  </dgm:styleLbl>
+  <dgm:styleLbl name="conFgAcc1">
+    <dgm:scene3d>
+      <a:camera prst="orthographicFront"/>
+      <a:lightRig rig="threePt" dir="t"/>
+    </dgm:scene3d>
+    <dgm:sp3d/>
+    <dgm:txPr/>
+    <dgm:style>
+      <a:lnRef idx="2">
+        <a:scrgbClr r="0" g="0" b="0"/>
+      </a:lnRef>
+      <a:fillRef idx="1">
+        <a:scrgbClr r="0" g="0" b="0"/>
+      </a:fillRef>
+      <a:effectRef idx="0">
+        <a:scrgbClr r="0" g="0" b="0"/>
+      </a:effectRef>
+      <a:fontRef idx="minor"/>
+    </dgm:style>
+  </dgm:styleLbl>
+  <dgm:styleLbl name="alignAcc1">
+    <dgm:scene3d>
+      <a:camera prst="orthographicFront"/>
+      <a:lightRig rig="threePt" dir="t"/>
+    </dgm:scene3d>
+    <dgm:sp3d/>
+    <dgm:txPr/>
+    <dgm:style>
+      <a:lnRef idx="2">
+        <a:scrgbClr r="0" g="0" b="0"/>
+      </a:lnRef>
+      <a:fillRef idx="1">
+        <a:scrgbClr r="0" g="0" b="0"/>
+      </a:fillRef>
+      <a:effectRef idx="0">
+        <a:scrgbClr r="0" g="0" b="0"/>
+      </a:effectRef>
+      <a:fontRef idx="minor"/>
+    </dgm:style>
+  </dgm:styleLbl>
+  <dgm:styleLbl name="trAlignAcc1">
+    <dgm:scene3d>
+      <a:camera prst="orthographicFront"/>
+      <a:lightRig rig="threePt" dir="t"/>
+    </dgm:scene3d>
+    <dgm:sp3d/>
+    <dgm:txPr/>
+    <dgm:style>
+      <a:lnRef idx="1">
+        <a:scrgbClr r="0" g="0" b="0"/>
+      </a:lnRef>
+      <a:fillRef idx="1">
+        <a:scrgbClr r="0" g="0" b="0"/>
+      </a:fillRef>
+      <a:effectRef idx="0">
+        <a:scrgbClr r="0" g="0" b="0"/>
+      </a:effectRef>
+      <a:fontRef idx="minor"/>
+    </dgm:style>
+  </dgm:styleLbl>
+  <dgm:styleLbl name="bgAcc1">
+    <dgm:scene3d>
+      <a:camera prst="orthographicFront"/>
+      <a:lightRig rig="threePt" dir="t"/>
+    </dgm:scene3d>
+    <dgm:sp3d/>
+    <dgm:txPr/>
+    <dgm:style>
+      <a:lnRef idx="2">
+        <a:scrgbClr r="0" g="0" b="0"/>
+      </a:lnRef>
+      <a:fillRef idx="1">
+        <a:scrgbClr r="0" g="0" b="0"/>
+      </a:fillRef>
+      <a:effectRef idx="0">
+        <a:scrgbClr r="0" g="0" b="0"/>
+      </a:effectRef>
+      <a:fontRef idx="minor"/>
+    </dgm:style>
+  </dgm:styleLbl>
+  <dgm:styleLbl name="solidFgAcc1">
+    <dgm:scene3d>
+      <a:camera prst="orthographicFront"/>
+      <a:lightRig rig="threePt" dir="t"/>
+    </dgm:scene3d>
+    <dgm:sp3d/>
+    <dgm:txPr/>
+    <dgm:style>
+      <a:lnRef idx="2">
+        <a:scrgbClr r="0" g="0" b="0"/>
+      </a:lnRef>
+      <a:fillRef idx="1">
+        <a:scrgbClr r="0" g="0" b="0"/>
+      </a:fillRef>
+      <a:effectRef idx="0">
+        <a:scrgbClr r="0" g="0" b="0"/>
+      </a:effectRef>
+      <a:fontRef idx="minor"/>
+    </dgm:style>
+  </dgm:styleLbl>
+  <dgm:styleLbl name="solidAlignAcc1">
+    <dgm:scene3d>
+      <a:camera prst="orthographicFront"/>
+      <a:lightRig rig="threePt" dir="t"/>
+    </dgm:scene3d>
+    <dgm:sp3d/>
+    <dgm:txPr/>
+    <dgm:style>
+      <a:lnRef idx="2">
+        <a:scrgbClr r="0" g="0" b="0"/>
+      </a:lnRef>
+      <a:fillRef idx="1">
+        <a:scrgbClr r="0" g="0" b="0"/>
+      </a:fillRef>
+      <a:effectRef idx="0">
+        <a:scrgbClr r="0" g="0" b="0"/>
+      </a:effectRef>
+      <a:fontRef idx="minor"/>
+    </dgm:style>
+  </dgm:styleLbl>
+  <dgm:styleLbl name="solidBgAcc1">
+    <dgm:scene3d>
+      <a:camera prst="orthographicFront"/>
+      <a:lightRig rig="threePt" dir="t"/>
+    </dgm:scene3d>
+    <dgm:sp3d/>
+    <dgm:txPr/>
+    <dgm:style>
+      <a:lnRef idx="2">
+        <a:scrgbClr r="0" g="0" b="0"/>
+      </a:lnRef>
+      <a:fillRef idx="1">
+        <a:scrgbClr r="0" g="0" b="0"/>
+      </a:fillRef>
+      <a:effectRef idx="0">
+        <a:scrgbClr r="0" g="0" b="0"/>
+      </a:effectRef>
+      <a:fontRef idx="minor"/>
+    </dgm:style>
+  </dgm:styleLbl>
+  <dgm:styleLbl name="fgAccFollowNode1">
+    <dgm:scene3d>
+      <a:camera prst="orthographicFront"/>
+      <a:lightRig rig="threePt" dir="t"/>
+    </dgm:scene3d>
+    <dgm:sp3d/>
+    <dgm:txPr/>
+    <dgm:style>
+      <a:lnRef idx="2">
+        <a:scrgbClr r="0" g="0" b="0"/>
+      </a:lnRef>
+      <a:fillRef idx="1">
+        <a:scrgbClr r="0" g="0" b="0"/>
+      </a:fillRef>
+      <a:effectRef idx="0">
+        <a:scrgbClr r="0" g="0" b="0"/>
+      </a:effectRef>
+      <a:fontRef idx="minor"/>
+    </dgm:style>
+  </dgm:styleLbl>
+  <dgm:styleLbl name="alignAccFollowNode1">
+    <dgm:scene3d>
+      <a:camera prst="orthographicFront"/>
+      <a:lightRig rig="threePt" dir="t"/>
+    </dgm:scene3d>
+    <dgm:sp3d/>
+    <dgm:txPr/>
+    <dgm:style>
+      <a:lnRef idx="2">
+        <a:scrgbClr r="0" g="0" b="0"/>
+      </a:lnRef>
+      <a:fillRef idx="1">
+        <a:scrgbClr r="0" g="0" b="0"/>
+      </a:fillRef>
+      <a:effectRef idx="0">
+        <a:scrgbClr r="0" g="0" b="0"/>
+      </a:effectRef>
+      <a:fontRef idx="minor"/>
+    </dgm:style>
+  </dgm:styleLbl>
+  <dgm:styleLbl name="bgAccFollowNode1">
+    <dgm:scene3d>
+      <a:camera prst="orthographicFront"/>
+      <a:lightRig rig="threePt" dir="t"/>
+    </dgm:scene3d>
+    <dgm:sp3d/>
+    <dgm:txPr/>
+    <dgm:style>
+      <a:lnRef idx="2">
+        <a:scrgbClr r="0" g="0" b="0"/>
+      </a:lnRef>
+      <a:fillRef idx="1">
+        <a:scrgbClr r="0" g="0" b="0"/>
+      </a:fillRef>
+      <a:effectRef idx="0">
+        <a:scrgbClr r="0" g="0" b="0"/>
+      </a:effectRef>
+      <a:fontRef idx="minor"/>
+    </dgm:style>
+  </dgm:styleLbl>
+  <dgm:styleLbl name="fgAcc0">
+    <dgm:scene3d>
+      <a:camera prst="orthographicFront"/>
+      <a:lightRig rig="threePt" dir="t"/>
+    </dgm:scene3d>
+    <dgm:sp3d/>
+    <dgm:txPr/>
+    <dgm:style>
+      <a:lnRef idx="2">
+        <a:scrgbClr r="0" g="0" b="0"/>
+      </a:lnRef>
+      <a:fillRef idx="1">
+        <a:scrgbClr r="0" g="0" b="0"/>
+      </a:fillRef>
+      <a:effectRef idx="0">
+        <a:scrgbClr r="0" g="0" b="0"/>
+      </a:effectRef>
+      <a:fontRef idx="minor"/>
+    </dgm:style>
+  </dgm:styleLbl>
+  <dgm:styleLbl name="fgAcc2">
+    <dgm:scene3d>
+      <a:camera prst="orthographicFront"/>
+      <a:lightRig rig="threePt" dir="t"/>
+    </dgm:scene3d>
+    <dgm:sp3d/>
+    <dgm:txPr/>
+    <dgm:style>
+      <a:lnRef idx="2">
+        <a:scrgbClr r="0" g="0" b="0"/>
+      </a:lnRef>
+      <a:fillRef idx="1">
+        <a:scrgbClr r="0" g="0" b="0"/>
+      </a:fillRef>
+      <a:effectRef idx="0">
+        <a:scrgbClr r="0" g="0" b="0"/>
+      </a:effectRef>
+      <a:fontRef idx="minor"/>
+    </dgm:style>
+  </dgm:styleLbl>
+  <dgm:styleLbl name="fgAcc3">
+    <dgm:scene3d>
+      <a:camera prst="orthographicFront"/>
+      <a:lightRig rig="threePt" dir="t"/>
+    </dgm:scene3d>
+    <dgm:sp3d/>
+    <dgm:txPr/>
+    <dgm:style>
+      <a:lnRef idx="2">
+        <a:scrgbClr r="0" g="0" b="0"/>
+      </a:lnRef>
+      <a:fillRef idx="1">
+        <a:scrgbClr r="0" g="0" b="0"/>
+      </a:fillRef>
+      <a:effectRef idx="0">
+        <a:scrgbClr r="0" g="0" b="0"/>
+      </a:effectRef>
+      <a:fontRef idx="minor"/>
+    </dgm:style>
+  </dgm:styleLbl>
+  <dgm:styleLbl name="fgAcc4">
+    <dgm:scene3d>
+      <a:camera prst="orthographicFront"/>
+      <a:lightRig rig="threePt" dir="t"/>
+    </dgm:scene3d>
+    <dgm:sp3d/>
+    <dgm:txPr/>
+    <dgm:style>
+      <a:lnRef idx="2">
+        <a:scrgbClr r="0" g="0" b="0"/>
+      </a:lnRef>
+      <a:fillRef idx="1">
+        <a:scrgbClr r="0" g="0" b="0"/>
+      </a:fillRef>
+      <a:effectRef idx="0">
+        <a:scrgbClr r="0" g="0" b="0"/>
+      </a:effectRef>
+      <a:fontRef idx="minor"/>
+    </dgm:style>
+  </dgm:styleLbl>
+  <dgm:styleLbl name="bgShp">
+    <dgm:scene3d>
+      <a:camera prst="orthographicFront"/>
+      <a:lightRig rig="threePt" dir="t"/>
+    </dgm:scene3d>
+    <dgm:sp3d/>
+    <dgm:txPr/>
+    <dgm:style>
+      <a:lnRef idx="0">
+        <a:scrgbClr r="0" g="0" b="0"/>
+      </a:lnRef>
+      <a:fillRef idx="1">
+        <a:scrgbClr r="0" g="0" b="0"/>
+      </a:fillRef>
+      <a:effectRef idx="0">
+        <a:scrgbClr r="0" g="0" b="0"/>
+      </a:effectRef>
+      <a:fontRef idx="minor"/>
+    </dgm:style>
+  </dgm:styleLbl>
+  <dgm:styleLbl name="dkBgShp">
+    <dgm:scene3d>
+      <a:camera prst="orthographicFront"/>
+      <a:lightRig rig="threePt" dir="t"/>
+    </dgm:scene3d>
+    <dgm:sp3d/>
+    <dgm:txPr/>
+    <dgm:style>
+      <a:lnRef idx="0">
+        <a:scrgbClr r="0" g="0" b="0"/>
+      </a:lnRef>
+      <a:fillRef idx="1">
+        <a:scrgbClr r="0" g="0" b="0"/>
+      </a:fillRef>
+      <a:effectRef idx="0">
+        <a:scrgbClr r="0" g="0" b="0"/>
+      </a:effectRef>
+      <a:fontRef idx="minor"/>
+    </dgm:style>
+  </dgm:styleLbl>
+  <dgm:styleLbl name="trBgShp">
+    <dgm:scene3d>
+      <a:camera prst="orthographicFront"/>
+      <a:lightRig rig="threePt" dir="t"/>
+    </dgm:scene3d>
+    <dgm:sp3d/>
+    <dgm:txPr/>
+    <dgm:style>
+      <a:lnRef idx="0">
+        <a:scrgbClr r="0" g="0" b="0"/>
+      </a:lnRef>
+      <a:fillRef idx="1">
+        <a:scrgbClr r="0" g="0" b="0"/>
+      </a:fillRef>
+      <a:effectRef idx="0">
+        <a:scrgbClr r="0" g="0" b="0"/>
+      </a:effectRef>
+      <a:fontRef idx="minor"/>
+    </dgm:style>
+  </dgm:styleLbl>
+  <dgm:styleLbl name="fgShp">
+    <dgm:scene3d>
+      <a:camera prst="orthographicFront"/>
+      <a:lightRig rig="threePt" dir="t"/>
+    </dgm:scene3d>
+    <dgm:sp3d/>
+    <dgm:txPr/>
+    <dgm:style>
+      <a:lnRef idx="2">
+        <a:scrgbClr r="0" g="0" b="0"/>
+      </a:lnRef>
+      <a:fillRef idx="1">
+        <a:scrgbClr r="0" g="0" b="0"/>
+      </a:fillRef>
+      <a:effectRef idx="0">
+        <a:scrgbClr r="0" g="0" b="0"/>
+      </a:effectRef>
+      <a:fontRef idx="minor"/>
+    </dgm:style>
+  </dgm:styleLbl>
+  <dgm:styleLbl name="revTx">
+    <dgm:scene3d>
+      <a:camera prst="orthographicFront"/>
+      <a:lightRig rig="threePt" dir="t"/>
+    </dgm:scene3d>
+    <dgm:sp3d/>
+    <dgm:txPr/>
+    <dgm:style>
+      <a:lnRef idx="0">
+        <a:scrgbClr r="0" g="0" b="0"/>
+      </a:lnRef>
+      <a:fillRef idx="0">
+        <a:scrgbClr r="0" g="0" b="0"/>
+      </a:fillRef>
+      <a:effectRef idx="0">
+        <a:scrgbClr r="0" g="0" b="0"/>
+      </a:effectRef>
+      <a:fontRef idx="minor"/>
+    </dgm:style>
+  </dgm:styleLbl>
+</dgm:styleDef>
 </file>
 
 <file path=ppt/notesMasters/notesMaster1.xml><?xml version="1.0" encoding="utf-8"?>
@@ -4462,9 +7202,7 @@
     <p:bg>
       <p:bgPr>
         <a:solidFill>
-          <a:schemeClr val="bg2">
-            <a:lumMod val="75000"/>
-          </a:schemeClr>
+          <a:schemeClr val="bg1"/>
         </a:solidFill>
         <a:effectLst/>
       </p:bgPr>
@@ -4483,6 +7221,120 @@
           <a:chExt cx="0" cy="0"/>
         </a:xfrm>
       </p:grpSpPr>
+      <p:sp useBgFill="1">
+        <p:nvSpPr>
+          <p:cNvPr id="13" name="Rectangle 9">
+            <a:extLst>
+              <a:ext uri="{FF2B5EF4-FFF2-40B4-BE49-F238E27FC236}">
+                <a16:creationId xmlns:a16="http://schemas.microsoft.com/office/drawing/2014/main" id="{B5D795CF-5F70-4821-BB11-0B2B8FCCD45A}"/>
+              </a:ext>
+              <a:ext uri="{C183D7F6-B498-43B3-948B-1728B52AA6E4}">
+                <adec:decorative xmlns:adec="http://schemas.microsoft.com/office/drawing/2017/decorative" val="1"/>
+              </a:ext>
+            </a:extLst>
+          </p:cNvPr>
+          <p:cNvSpPr>
+            <a:spLocks noGrp="1" noRot="1" noChangeAspect="1" noMove="1" noResize="1" noEditPoints="1" noAdjustHandles="1" noChangeArrowheads="1" noChangeShapeType="1" noTextEdit="1"/>
+          </p:cNvSpPr>
+          <p:nvPr>
+            <p:extLst>
+              <p:ext uri="{386F3935-93C4-4BCD-93E2-E3B085C9AB24}">
+                <p16:designElem xmlns:p16="http://schemas.microsoft.com/office/powerpoint/2015/main" val="1"/>
+              </p:ext>
+            </p:extLst>
+          </p:nvPr>
+        </p:nvSpPr>
+        <p:spPr>
+          <a:xfrm>
+            <a:off x="0" y="638175"/>
+            <a:ext cx="12191999" cy="6219825"/>
+          </a:xfrm>
+          <a:prstGeom prst="rect">
+            <a:avLst/>
+          </a:prstGeom>
+          <a:ln>
+            <a:noFill/>
+          </a:ln>
+        </p:spPr>
+        <p:style>
+          <a:lnRef idx="2">
+            <a:schemeClr val="accent1">
+              <a:shade val="50000"/>
+            </a:schemeClr>
+          </a:lnRef>
+          <a:fillRef idx="1">
+            <a:schemeClr val="accent1"/>
+          </a:fillRef>
+          <a:effectRef idx="0">
+            <a:schemeClr val="accent1"/>
+          </a:effectRef>
+          <a:fontRef idx="minor">
+            <a:schemeClr val="lt1"/>
+          </a:fontRef>
+        </p:style>
+        <p:txBody>
+          <a:bodyPr rtlCol="0" anchor="ctr"/>
+          <a:lstStyle/>
+          <a:p>
+            <a:pPr algn="ctr"/>
+            <a:endParaRPr lang="en-US"/>
+          </a:p>
+        </p:txBody>
+      </p:sp>
+      <p:sp>
+        <p:nvSpPr>
+          <p:cNvPr id="12" name="Rectangle 11">
+            <a:extLst>
+              <a:ext uri="{FF2B5EF4-FFF2-40B4-BE49-F238E27FC236}">
+                <a16:creationId xmlns:a16="http://schemas.microsoft.com/office/drawing/2014/main" id="{73B1AC31-0B6C-4781-BA06-16BE17F8AFBE}"/>
+              </a:ext>
+              <a:ext uri="{C183D7F6-B498-43B3-948B-1728B52AA6E4}">
+                <adec:decorative xmlns:adec="http://schemas.microsoft.com/office/drawing/2017/decorative" val="1"/>
+              </a:ext>
+            </a:extLst>
+          </p:cNvPr>
+          <p:cNvSpPr>
+            <a:spLocks noGrp="1" noRot="1" noChangeAspect="1" noMove="1" noResize="1" noEditPoints="1" noAdjustHandles="1" noChangeArrowheads="1" noChangeShapeType="1" noTextEdit="1"/>
+          </p:cNvSpPr>
+          <p:nvPr>
+            <p:extLst>
+              <p:ext uri="{386F3935-93C4-4BCD-93E2-E3B085C9AB24}">
+                <p16:designElem xmlns:p16="http://schemas.microsoft.com/office/powerpoint/2015/main" val="1"/>
+              </p:ext>
+            </p:extLst>
+          </p:nvPr>
+        </p:nvSpPr>
+        <p:spPr>
+          <a:xfrm>
+            <a:off x="4246851" y="723899"/>
+            <a:ext cx="7498616" cy="5666666"/>
+          </a:xfrm>
+          <a:prstGeom prst="rect">
+            <a:avLst/>
+          </a:prstGeom>
+          <a:solidFill>
+            <a:schemeClr val="accent1"/>
+          </a:solidFill>
+          <a:ln>
+            <a:noFill/>
+          </a:ln>
+          <a:effectLst/>
+        </p:spPr>
+        <p:style>
+          <a:lnRef idx="1">
+            <a:schemeClr val="accent1"/>
+          </a:lnRef>
+          <a:fillRef idx="3">
+            <a:schemeClr val="accent1"/>
+          </a:fillRef>
+          <a:effectRef idx="2">
+            <a:schemeClr val="accent1"/>
+          </a:effectRef>
+          <a:fontRef idx="minor">
+            <a:schemeClr val="lt1"/>
+          </a:fontRef>
+        </p:style>
+      </p:sp>
       <p:sp>
         <p:nvSpPr>
           <p:cNvPr id="2" name="Titel 1">
@@ -4501,19 +7353,18 @@
         </p:nvSpPr>
         <p:spPr>
           <a:xfrm>
-            <a:off x="1839468" y="331724"/>
-            <a:ext cx="8263128" cy="4470399"/>
+            <a:off x="4579243" y="1419225"/>
+            <a:ext cx="6798608" cy="2085869"/>
           </a:xfrm>
-          <a:noFill/>
         </p:spPr>
         <p:txBody>
-          <a:bodyPr anchor="ctr">
+          <a:bodyPr>
             <a:normAutofit/>
           </a:bodyPr>
           <a:lstStyle/>
           <a:p>
             <a:r>
-              <a:rPr lang="da-DK" sz="5400" dirty="0">
+              <a:rPr lang="da-DK" sz="4800" dirty="0">
                 <a:solidFill>
                   <a:srgbClr val="FFFFFF"/>
                 </a:solidFill>
@@ -4541,27 +7392,103 @@
         </p:nvSpPr>
         <p:spPr>
           <a:xfrm>
-            <a:off x="1261872" y="5533371"/>
-            <a:ext cx="9418320" cy="896658"/>
+            <a:off x="4579243" y="3505095"/>
+            <a:ext cx="6798608" cy="1733655"/>
           </a:xfrm>
         </p:spPr>
         <p:txBody>
-          <a:bodyPr anchor="ctr">
-            <a:normAutofit/>
+          <a:bodyPr>
+            <a:normAutofit lnSpcReduction="10000"/>
           </a:bodyPr>
           <a:lstStyle/>
           <a:p>
-            <a:r>
-              <a:rPr lang="da-DK" sz="2800" dirty="0">
+            <a:endParaRPr lang="da-DK" dirty="0">
+              <a:solidFill>
+                <a:srgbClr val="EBEBEB"/>
+              </a:solidFill>
+            </a:endParaRPr>
+          </a:p>
+          <a:p>
+            <a:r>
+              <a:rPr lang="da-DK" dirty="0">
                 <a:solidFill>
-                  <a:schemeClr val="tx1"/>
+                  <a:srgbClr val="EBEBEB"/>
                 </a:solidFill>
               </a:rPr>
-              <a:t>Af Patrick, Matthias, Christian og Casper</a:t>
+              <a:t>Patrick Sirich </a:t>
+            </a:r>
+          </a:p>
+          <a:p>
+            <a:r>
+              <a:rPr lang="da-DK" dirty="0">
+                <a:solidFill>
+                  <a:srgbClr val="EBEBEB"/>
+                </a:solidFill>
+              </a:rPr>
+              <a:t>Matthias Skou</a:t>
+            </a:r>
+          </a:p>
+          <a:p>
+            <a:r>
+              <a:rPr lang="da-DK" dirty="0">
+                <a:solidFill>
+                  <a:srgbClr val="EBEBEB"/>
+                </a:solidFill>
+              </a:rPr>
+              <a:t>Christian Strunge</a:t>
+            </a:r>
+          </a:p>
+          <a:p>
+            <a:r>
+              <a:rPr lang="da-DK" dirty="0">
+                <a:solidFill>
+                  <a:srgbClr val="EBEBEB"/>
+                </a:solidFill>
+              </a:rPr>
+              <a:t>Casper Frost</a:t>
             </a:r>
           </a:p>
         </p:txBody>
       </p:sp>
+      <p:pic>
+        <p:nvPicPr>
+          <p:cNvPr id="7" name="Graphic 6">
+            <a:extLst>
+              <a:ext uri="{FF2B5EF4-FFF2-40B4-BE49-F238E27FC236}">
+                <a16:creationId xmlns:a16="http://schemas.microsoft.com/office/drawing/2014/main" id="{06CA165C-6172-418D-92EE-05500D9C0002}"/>
+              </a:ext>
+            </a:extLst>
+          </p:cNvPr>
+          <p:cNvPicPr>
+            <a:picLocks noChangeAspect="1"/>
+          </p:cNvPicPr>
+          <p:nvPr/>
+        </p:nvPicPr>
+        <p:blipFill>
+          <a:blip r:embed="rId2">
+            <a:extLst>
+              <a:ext uri="{28A0092B-C50C-407E-A947-70E740481C1C}">
+                <a14:useLocalDpi xmlns:a14="http://schemas.microsoft.com/office/drawing/2010/main" val="0"/>
+              </a:ext>
+              <a:ext uri="{96DAC541-7B7A-43D3-8B79-37D633B846F1}">
+                <asvg:svgBlip xmlns:asvg="http://schemas.microsoft.com/office/drawing/2016/SVG/main" r:embed="rId3"/>
+              </a:ext>
+            </a:extLst>
+          </a:blip>
+          <a:stretch>
+            <a:fillRect/>
+          </a:stretch>
+        </p:blipFill>
+        <p:spPr>
+          <a:xfrm>
+            <a:off x="770299" y="2010616"/>
+            <a:ext cx="3058835" cy="3058835"/>
+          </a:xfrm>
+          <a:prstGeom prst="rect">
+            <a:avLst/>
+          </a:prstGeom>
+        </p:spPr>
+      </p:pic>
     </p:spTree>
     <p:extLst>
       <p:ext uri="{BB962C8B-B14F-4D97-AF65-F5344CB8AC3E}">
@@ -4717,8 +7644,21 @@
             <a:pPr lvl="2"/>
             <a:r>
               <a:rPr lang="da-DK" dirty="0"/>
-              <a:t>Udviklingsmodellen</a:t>
-            </a:r>
+              <a:t>UP </a:t>
+            </a:r>
+            <a:r>
+              <a:rPr lang="da-DK" dirty="0" err="1"/>
+              <a:t>vs</a:t>
+            </a:r>
+            <a:r>
+              <a:rPr lang="da-DK" dirty="0"/>
+              <a:t> </a:t>
+            </a:r>
+            <a:r>
+              <a:rPr lang="da-DK" dirty="0" err="1"/>
+              <a:t>Scrum</a:t>
+            </a:r>
+            <a:endParaRPr lang="da-DK" dirty="0"/>
           </a:p>
           <a:p>
             <a:pPr lvl="1"/>
@@ -4773,6 +7713,14 @@
 <file path=ppt/slides/slide3.xml><?xml version="1.0" encoding="utf-8"?>
 <p:sld xmlns:a="http://schemas.openxmlformats.org/drawingml/2006/main" xmlns:r="http://schemas.openxmlformats.org/officeDocument/2006/relationships" xmlns:p="http://schemas.openxmlformats.org/presentationml/2006/main">
   <p:cSld>
+    <p:bg>
+      <p:bgPr>
+        <a:solidFill>
+          <a:schemeClr val="bg1"/>
+        </a:solidFill>
+        <a:effectLst/>
+      </p:bgPr>
+    </p:bg>
     <p:spTree>
       <p:nvGrpSpPr>
         <p:cNvPr id="1" name=""/>
@@ -4787,6 +7735,126 @@
           <a:chExt cx="0" cy="0"/>
         </a:xfrm>
       </p:grpSpPr>
+      <p:sp useBgFill="1">
+        <p:nvSpPr>
+          <p:cNvPr id="23" name="Rectangle 14">
+            <a:extLst>
+              <a:ext uri="{FF2B5EF4-FFF2-40B4-BE49-F238E27FC236}">
+                <a16:creationId xmlns:a16="http://schemas.microsoft.com/office/drawing/2014/main" id="{B373F125-DEF3-41D6-9918-AB21A2ACC37A}"/>
+              </a:ext>
+              <a:ext uri="{C183D7F6-B498-43B3-948B-1728B52AA6E4}">
+                <adec:decorative xmlns:adec="http://schemas.microsoft.com/office/drawing/2017/decorative" val="1"/>
+              </a:ext>
+            </a:extLst>
+          </p:cNvPr>
+          <p:cNvSpPr>
+            <a:spLocks noGrp="1" noRot="1" noChangeAspect="1" noMove="1" noResize="1" noEditPoints="1" noAdjustHandles="1" noChangeArrowheads="1" noChangeShapeType="1" noTextEdit="1"/>
+          </p:cNvSpPr>
+          <p:nvPr>
+            <p:extLst>
+              <p:ext uri="{386F3935-93C4-4BCD-93E2-E3B085C9AB24}">
+                <p16:designElem xmlns:p16="http://schemas.microsoft.com/office/powerpoint/2015/main" val="1"/>
+              </p:ext>
+            </p:extLst>
+          </p:nvPr>
+        </p:nvSpPr>
+        <p:spPr>
+          <a:xfrm>
+            <a:off x="0" y="0"/>
+            <a:ext cx="12192000" cy="6858000"/>
+          </a:xfrm>
+          <a:prstGeom prst="rect">
+            <a:avLst/>
+          </a:prstGeom>
+          <a:ln>
+            <a:noFill/>
+          </a:ln>
+        </p:spPr>
+        <p:style>
+          <a:lnRef idx="2">
+            <a:schemeClr val="accent1">
+              <a:shade val="50000"/>
+            </a:schemeClr>
+          </a:lnRef>
+          <a:fillRef idx="1">
+            <a:schemeClr val="accent1"/>
+          </a:fillRef>
+          <a:effectRef idx="0">
+            <a:schemeClr val="accent1"/>
+          </a:effectRef>
+          <a:fontRef idx="minor">
+            <a:schemeClr val="lt1"/>
+          </a:fontRef>
+        </p:style>
+        <p:txBody>
+          <a:bodyPr rtlCol="0" anchor="ctr"/>
+          <a:lstStyle/>
+          <a:p>
+            <a:pPr algn="ctr"/>
+            <a:endParaRPr lang="en-US"/>
+          </a:p>
+        </p:txBody>
+      </p:sp>
+      <p:sp>
+        <p:nvSpPr>
+          <p:cNvPr id="24" name="Rectangle 16">
+            <a:extLst>
+              <a:ext uri="{FF2B5EF4-FFF2-40B4-BE49-F238E27FC236}">
+                <a16:creationId xmlns:a16="http://schemas.microsoft.com/office/drawing/2014/main" id="{71E9F226-EB6E-48C9-ADDA-636DE4BF4EBE}"/>
+              </a:ext>
+              <a:ext uri="{C183D7F6-B498-43B3-948B-1728B52AA6E4}">
+                <adec:decorative xmlns:adec="http://schemas.microsoft.com/office/drawing/2017/decorative" val="1"/>
+              </a:ext>
+            </a:extLst>
+          </p:cNvPr>
+          <p:cNvSpPr>
+            <a:spLocks noGrp="1" noRot="1" noChangeAspect="1" noMove="1" noResize="1" noEditPoints="1" noAdjustHandles="1" noChangeArrowheads="1" noChangeShapeType="1" noTextEdit="1"/>
+          </p:cNvSpPr>
+          <p:nvPr>
+            <p:extLst>
+              <p:ext uri="{386F3935-93C4-4BCD-93E2-E3B085C9AB24}">
+                <p16:designElem xmlns:p16="http://schemas.microsoft.com/office/powerpoint/2015/main" val="1"/>
+              </p:ext>
+            </p:extLst>
+          </p:nvPr>
+        </p:nvSpPr>
+        <p:spPr>
+          <a:xfrm>
+            <a:off x="490581" y="485678"/>
+            <a:ext cx="4174743" cy="5888772"/>
+          </a:xfrm>
+          <a:prstGeom prst="rect">
+            <a:avLst/>
+          </a:prstGeom>
+          <a:ln>
+            <a:noFill/>
+          </a:ln>
+        </p:spPr>
+        <p:style>
+          <a:lnRef idx="2">
+            <a:schemeClr val="accent1">
+              <a:shade val="50000"/>
+            </a:schemeClr>
+          </a:lnRef>
+          <a:fillRef idx="1">
+            <a:schemeClr val="accent1"/>
+          </a:fillRef>
+          <a:effectRef idx="0">
+            <a:schemeClr val="accent1"/>
+          </a:effectRef>
+          <a:fontRef idx="minor">
+            <a:schemeClr val="lt1"/>
+          </a:fontRef>
+        </p:style>
+        <p:txBody>
+          <a:bodyPr rtlCol="0" anchor="ctr"/>
+          <a:lstStyle/>
+          <a:p>
+            <a:pPr algn="ctr"/>
+            <a:endParaRPr lang="en-US"/>
+          </a:p>
+        </p:txBody>
+      </p:sp>
       <p:sp>
         <p:nvSpPr>
           <p:cNvPr id="2" name="Titel 1">
@@ -4803,13 +7871,25 @@
             <p:ph type="title"/>
           </p:nvPr>
         </p:nvSpPr>
-        <p:spPr/>
+        <p:spPr>
+          <a:xfrm>
+            <a:off x="959157" y="1113764"/>
+            <a:ext cx="3269749" cy="4624327"/>
+          </a:xfrm>
+        </p:spPr>
         <p:txBody>
-          <a:bodyPr/>
+          <a:bodyPr anchor="ctr">
+            <a:normAutofit/>
+          </a:bodyPr>
           <a:lstStyle/>
           <a:p>
-            <a:r>
-              <a:rPr lang="da-DK" dirty="0"/>
+            <a:pPr algn="ctr"/>
+            <a:r>
+              <a:rPr lang="da-DK" sz="3200" dirty="0">
+                <a:solidFill>
+                  <a:srgbClr val="FFFFFF"/>
+                </a:solidFill>
+              </a:rPr>
               <a:t>People</a:t>
             </a:r>
           </a:p>
@@ -4833,180 +7913,224 @@
         </p:nvSpPr>
         <p:spPr>
           <a:xfrm>
-            <a:off x="1203767" y="1865376"/>
-            <a:ext cx="9479665" cy="4732194"/>
+            <a:off x="5155905" y="1113764"/>
+            <a:ext cx="6108179" cy="4624327"/>
           </a:xfrm>
         </p:spPr>
         <p:txBody>
-          <a:bodyPr>
-            <a:normAutofit fontScale="70000" lnSpcReduction="20000"/>
+          <a:bodyPr anchor="ctr">
+            <a:normAutofit fontScale="92500" lnSpcReduction="20000"/>
           </a:bodyPr>
           <a:lstStyle/>
           <a:p>
-            <a:r>
-              <a:rPr lang="da-DK" sz="1700" dirty="0"/>
+            <a:pPr>
+              <a:lnSpc>
+                <a:spcPct val="90000"/>
+              </a:lnSpc>
+            </a:pPr>
+            <a:r>
+              <a:rPr lang="da-DK" sz="1300" dirty="0"/>
               <a:t>Rollefordeling</a:t>
             </a:r>
           </a:p>
           <a:p>
-            <a:pPr lvl="1"/>
-            <a:r>
-              <a:rPr lang="da-DK" sz="1700" dirty="0"/>
-              <a:t>Patrick: Product </a:t>
-            </a:r>
-            <a:r>
-              <a:rPr lang="da-DK" sz="1700" dirty="0" err="1"/>
-              <a:t>Owner</a:t>
-            </a:r>
-            <a:endParaRPr lang="da-DK" sz="1700" dirty="0"/>
-          </a:p>
-          <a:p>
-            <a:pPr lvl="2"/>
-            <a:r>
-              <a:rPr lang="da-DK" sz="1700" dirty="0"/>
-              <a:t>User </a:t>
-            </a:r>
-            <a:r>
-              <a:rPr lang="da-DK" sz="1700" dirty="0" err="1"/>
-              <a:t>stories</a:t>
-            </a:r>
-            <a:endParaRPr lang="da-DK" sz="1700" dirty="0"/>
-          </a:p>
-          <a:p>
-            <a:pPr lvl="2"/>
-            <a:r>
-              <a:rPr lang="da-DK" sz="1700" dirty="0"/>
-              <a:t>Product </a:t>
-            </a:r>
-            <a:r>
-              <a:rPr lang="da-DK" sz="1700" dirty="0" err="1"/>
-              <a:t>Backlog</a:t>
-            </a:r>
-            <a:endParaRPr lang="da-DK" sz="1700" dirty="0"/>
-          </a:p>
-          <a:p>
-            <a:pPr lvl="1"/>
-            <a:r>
-              <a:rPr lang="da-DK" sz="1700" dirty="0"/>
+            <a:pPr lvl="1">
+              <a:lnSpc>
+                <a:spcPct val="90000"/>
+              </a:lnSpc>
+            </a:pPr>
+            <a:r>
+              <a:rPr lang="da-DK" sz="1300" dirty="0"/>
+              <a:t>Patrick: Product Owner</a:t>
+            </a:r>
+          </a:p>
+          <a:p>
+            <a:pPr lvl="2">
+              <a:lnSpc>
+                <a:spcPct val="90000"/>
+              </a:lnSpc>
+            </a:pPr>
+            <a:r>
+              <a:rPr lang="da-DK" sz="1300" dirty="0"/>
+              <a:t>User stories</a:t>
+            </a:r>
+          </a:p>
+          <a:p>
+            <a:pPr lvl="2">
+              <a:lnSpc>
+                <a:spcPct val="90000"/>
+              </a:lnSpc>
+            </a:pPr>
+            <a:r>
+              <a:rPr lang="da-DK" sz="1300" dirty="0"/>
+              <a:t>Product Backlog</a:t>
+            </a:r>
+          </a:p>
+          <a:p>
+            <a:pPr lvl="1">
+              <a:lnSpc>
+                <a:spcPct val="90000"/>
+              </a:lnSpc>
+            </a:pPr>
+            <a:r>
+              <a:rPr lang="da-DK" sz="1300" dirty="0"/>
               <a:t>Casper: Rapport-ansvarlig</a:t>
             </a:r>
           </a:p>
           <a:p>
-            <a:pPr lvl="2"/>
-            <a:r>
-              <a:rPr lang="da-DK" sz="1700" dirty="0"/>
+            <a:pPr lvl="2">
+              <a:lnSpc>
+                <a:spcPct val="90000"/>
+              </a:lnSpc>
+            </a:pPr>
+            <a:r>
+              <a:rPr lang="da-DK" sz="1300" dirty="0"/>
               <a:t>Layout</a:t>
             </a:r>
           </a:p>
           <a:p>
-            <a:pPr lvl="2"/>
-            <a:r>
-              <a:rPr lang="da-DK" sz="1700" dirty="0"/>
+            <a:pPr lvl="2">
+              <a:lnSpc>
+                <a:spcPct val="90000"/>
+              </a:lnSpc>
+            </a:pPr>
+            <a:r>
+              <a:rPr lang="da-DK" sz="1300" dirty="0"/>
               <a:t>Rød tråd</a:t>
             </a:r>
           </a:p>
           <a:p>
-            <a:pPr lvl="1"/>
-            <a:r>
-              <a:rPr lang="da-DK" sz="1700" dirty="0"/>
-              <a:t>Matthias: Kode- og </a:t>
-            </a:r>
-            <a:r>
-              <a:rPr lang="da-DK" sz="1700" dirty="0" err="1"/>
-              <a:t>task</a:t>
-            </a:r>
-            <a:r>
-              <a:rPr lang="da-DK" sz="1700" dirty="0"/>
-              <a:t> ansvarlig</a:t>
-            </a:r>
-          </a:p>
-          <a:p>
-            <a:pPr lvl="2"/>
-            <a:r>
-              <a:rPr lang="da-DK" sz="1700" dirty="0" err="1"/>
-              <a:t>Task</a:t>
-            </a:r>
-            <a:r>
-              <a:rPr lang="da-DK" sz="1700" dirty="0"/>
-              <a:t> prioritering</a:t>
-            </a:r>
-          </a:p>
-          <a:p>
-            <a:pPr lvl="2"/>
-            <a:r>
-              <a:rPr lang="da-DK" sz="1700" dirty="0"/>
-              <a:t>End tests &amp; </a:t>
-            </a:r>
-            <a:r>
-              <a:rPr lang="da-DK" sz="1700" dirty="0" err="1"/>
+            <a:pPr lvl="1">
+              <a:lnSpc>
+                <a:spcPct val="90000"/>
+              </a:lnSpc>
+            </a:pPr>
+            <a:r>
+              <a:rPr lang="da-DK" sz="1300" dirty="0"/>
+              <a:t>Matthias: Kode- og task ansvarlig</a:t>
+            </a:r>
+          </a:p>
+          <a:p>
+            <a:pPr lvl="2">
+              <a:lnSpc>
+                <a:spcPct val="90000"/>
+              </a:lnSpc>
+            </a:pPr>
+            <a:r>
+              <a:rPr lang="da-DK" sz="1300" dirty="0"/>
+              <a:t>Task prioritering</a:t>
+            </a:r>
+          </a:p>
+          <a:p>
+            <a:pPr lvl="2">
+              <a:lnSpc>
+                <a:spcPct val="90000"/>
+              </a:lnSpc>
+            </a:pPr>
+            <a:r>
+              <a:rPr lang="da-DK" sz="1300" dirty="0"/>
+              <a:t>End tests &amp; Reviews</a:t>
+            </a:r>
+          </a:p>
+          <a:p>
+            <a:pPr lvl="1">
+              <a:lnSpc>
+                <a:spcPct val="90000"/>
+              </a:lnSpc>
+            </a:pPr>
+            <a:r>
+              <a:rPr lang="da-DK" sz="1300" dirty="0"/>
+              <a:t>Christian: SCRUM-Master &amp; Project Manager</a:t>
+            </a:r>
+          </a:p>
+          <a:p>
+            <a:pPr lvl="2">
+              <a:lnSpc>
+                <a:spcPct val="90000"/>
+              </a:lnSpc>
+            </a:pPr>
+            <a:r>
+              <a:rPr lang="da-DK" sz="1300" dirty="0"/>
+              <a:t>SCRUM</a:t>
+            </a:r>
+          </a:p>
+          <a:p>
+            <a:pPr lvl="2">
+              <a:lnSpc>
+                <a:spcPct val="90000"/>
+              </a:lnSpc>
+            </a:pPr>
+            <a:r>
+              <a:rPr lang="da-DK" sz="1300" dirty="0"/>
+              <a:t>Arbejdsmiljø</a:t>
+            </a:r>
+          </a:p>
+          <a:p>
+            <a:pPr lvl="1">
+              <a:lnSpc>
+                <a:spcPct val="90000"/>
+              </a:lnSpc>
+            </a:pPr>
+            <a:r>
+              <a:rPr lang="da-DK" sz="1300" dirty="0"/>
+              <a:t>Formål?</a:t>
+            </a:r>
+          </a:p>
+          <a:p>
+            <a:pPr lvl="2">
+              <a:lnSpc>
+                <a:spcPct val="90000"/>
+              </a:lnSpc>
+            </a:pPr>
+            <a:r>
+              <a:rPr lang="da-DK" sz="1300" dirty="0"/>
+              <a:t>Arbejdsfordeling</a:t>
+            </a:r>
+          </a:p>
+          <a:p>
+            <a:pPr lvl="2">
+              <a:lnSpc>
+                <a:spcPct val="90000"/>
+              </a:lnSpc>
+            </a:pPr>
+            <a:r>
+              <a:rPr lang="da-DK" sz="1300" dirty="0" err="1"/>
+              <a:t>Effiktivitet</a:t>
+            </a:r>
+            <a:r>
+              <a:rPr lang="da-DK" sz="1300" dirty="0"/>
+              <a:t> &amp; forcer</a:t>
+            </a:r>
+          </a:p>
+          <a:p>
+            <a:pPr lvl="2">
+              <a:lnSpc>
+                <a:spcPct val="90000"/>
+              </a:lnSpc>
+            </a:pPr>
+            <a:r>
+              <a:rPr lang="da-DK" sz="1300" dirty="0"/>
+              <a:t>Beslutningstagen</a:t>
+            </a:r>
+          </a:p>
+          <a:p>
+            <a:pPr lvl="2">
+              <a:lnSpc>
+                <a:spcPct val="90000"/>
+              </a:lnSpc>
+            </a:pPr>
+            <a:r>
+              <a:rPr lang="da-DK" sz="1300" dirty="0"/>
               <a:t>Reviews</a:t>
             </a:r>
-            <a:endParaRPr lang="da-DK" sz="1700" dirty="0"/>
-          </a:p>
-          <a:p>
-            <a:pPr lvl="1"/>
-            <a:r>
-              <a:rPr lang="da-DK" sz="1700" dirty="0"/>
-              <a:t>Christian: SCRUM-Master &amp; Project Manager</a:t>
-            </a:r>
-          </a:p>
-          <a:p>
-            <a:pPr lvl="2"/>
-            <a:r>
-              <a:rPr lang="da-DK" sz="1700" dirty="0"/>
-              <a:t>SCRUM</a:t>
-            </a:r>
-          </a:p>
-          <a:p>
-            <a:pPr lvl="2"/>
-            <a:r>
-              <a:rPr lang="da-DK" sz="1700" dirty="0"/>
-              <a:t>Arbejdsmiljø</a:t>
-            </a:r>
-          </a:p>
-          <a:p>
-            <a:pPr lvl="1"/>
-            <a:r>
-              <a:rPr lang="da-DK" sz="1700" dirty="0"/>
-              <a:t>Formål?</a:t>
-            </a:r>
-          </a:p>
-          <a:p>
-            <a:pPr lvl="2"/>
-            <a:r>
-              <a:rPr lang="da-DK" sz="1700" dirty="0"/>
-              <a:t>Arbejdsfordeling</a:t>
-            </a:r>
-          </a:p>
-          <a:p>
-            <a:pPr lvl="2"/>
-            <a:r>
-              <a:rPr lang="da-DK" sz="1700" dirty="0" err="1"/>
-              <a:t>Effiktivitet</a:t>
-            </a:r>
-            <a:r>
-              <a:rPr lang="da-DK" sz="1700" dirty="0"/>
-              <a:t> &amp; forcer</a:t>
-            </a:r>
-          </a:p>
-          <a:p>
-            <a:pPr lvl="2"/>
-            <a:r>
-              <a:rPr lang="da-DK" sz="1700" dirty="0"/>
-              <a:t>Beslutningstagen</a:t>
-            </a:r>
-          </a:p>
-          <a:p>
-            <a:pPr lvl="2"/>
-            <a:r>
-              <a:rPr lang="da-DK" sz="1700" dirty="0" err="1"/>
-              <a:t>Reviews</a:t>
-            </a:r>
-            <a:endParaRPr lang="da-DK" sz="1700" dirty="0"/>
-          </a:p>
-          <a:p>
-            <a:pPr lvl="1"/>
-            <a:endParaRPr lang="da-DK" dirty="0"/>
+          </a:p>
+          <a:p>
+            <a:pPr lvl="1">
+              <a:lnSpc>
+                <a:spcPct val="90000"/>
+              </a:lnSpc>
+            </a:pPr>
+            <a:endParaRPr lang="da-DK" sz="1300" dirty="0"/>
           </a:p>
         </p:txBody>
       </p:sp>
@@ -5026,6 +8150,14 @@
 <file path=ppt/slides/slide4.xml><?xml version="1.0" encoding="utf-8"?>
 <p:sld xmlns:a="http://schemas.openxmlformats.org/drawingml/2006/main" xmlns:r="http://schemas.openxmlformats.org/officeDocument/2006/relationships" xmlns:p="http://schemas.openxmlformats.org/presentationml/2006/main">
   <p:cSld>
+    <p:bg>
+      <p:bgPr>
+        <a:solidFill>
+          <a:schemeClr val="bg1"/>
+        </a:solidFill>
+        <a:effectLst/>
+      </p:bgPr>
+    </p:bg>
     <p:spTree>
       <p:nvGrpSpPr>
         <p:cNvPr id="1" name=""/>
@@ -5056,82 +8188,60 @@
             <p:ph type="title"/>
           </p:nvPr>
         </p:nvSpPr>
-        <p:spPr/>
+        <p:spPr>
+          <a:xfrm>
+            <a:off x="581192" y="702156"/>
+            <a:ext cx="11029616" cy="1013800"/>
+          </a:xfrm>
+        </p:spPr>
         <p:txBody>
-          <a:bodyPr/>
+          <a:bodyPr>
+            <a:normAutofit/>
+          </a:bodyPr>
           <a:lstStyle/>
           <a:p>
             <a:r>
-              <a:rPr lang="da-DK" dirty="0"/>
+              <a:rPr lang="da-DK">
+                <a:solidFill>
+                  <a:srgbClr val="FFFEFF"/>
+                </a:solidFill>
+              </a:rPr>
               <a:t>Product</a:t>
             </a:r>
           </a:p>
         </p:txBody>
       </p:sp>
-      <p:sp>
-        <p:nvSpPr>
-          <p:cNvPr id="3" name="Pladsholder til indhold 2">
+      <p:graphicFrame>
+        <p:nvGraphicFramePr>
+          <p:cNvPr id="20" name="Pladsholder til indhold 2">
             <a:extLst>
               <a:ext uri="{FF2B5EF4-FFF2-40B4-BE49-F238E27FC236}">
-                <a16:creationId xmlns:a16="http://schemas.microsoft.com/office/drawing/2014/main" id="{49D76E36-7768-45CB-872A-66C3D7A504DA}"/>
+                <a16:creationId xmlns:a16="http://schemas.microsoft.com/office/drawing/2014/main" id="{68D061BA-49F3-484C-A313-0C7BE7FA5194}"/>
               </a:ext>
             </a:extLst>
           </p:cNvPr>
-          <p:cNvSpPr>
-            <a:spLocks noGrp="1"/>
-          </p:cNvSpPr>
+          <p:cNvGraphicFramePr>
+            <a:graphicFrameLocks noGrp="1"/>
+          </p:cNvGraphicFramePr>
           <p:nvPr>
             <p:ph idx="1"/>
-          </p:nvPr>
-        </p:nvSpPr>
-        <p:spPr/>
-        <p:txBody>
-          <a:bodyPr/>
-          <a:lstStyle/>
-          <a:p>
-            <a:r>
-              <a:rPr lang="da-DK" dirty="0" err="1"/>
-              <a:t>YourLocal</a:t>
-            </a:r>
-            <a:r>
-              <a:rPr lang="da-DK" dirty="0"/>
-              <a:t> API</a:t>
-            </a:r>
-          </a:p>
-          <a:p>
-            <a:endParaRPr lang="da-DK" dirty="0"/>
-          </a:p>
-          <a:p>
-            <a:r>
-              <a:rPr lang="da-DK" dirty="0" err="1"/>
-              <a:t>TheNext</a:t>
-            </a:r>
-            <a:r>
-              <a:rPr lang="da-DK" dirty="0"/>
-              <a:t> API</a:t>
-            </a:r>
-          </a:p>
-          <a:p>
-            <a:endParaRPr lang="da-DK" dirty="0"/>
-          </a:p>
-          <a:p>
-            <a:r>
-              <a:rPr lang="da-DK" dirty="0" err="1"/>
-              <a:t>Geolokation</a:t>
-            </a:r>
-            <a:endParaRPr lang="da-DK" dirty="0"/>
-          </a:p>
-          <a:p>
-            <a:endParaRPr lang="da-DK" dirty="0"/>
-          </a:p>
-          <a:p>
-            <a:r>
-              <a:rPr lang="da-DK" dirty="0"/>
-              <a:t>Misforståelse</a:t>
-            </a:r>
-          </a:p>
-        </p:txBody>
-      </p:sp>
+            <p:extLst>
+              <p:ext uri="{D42A27DB-BD31-4B8C-83A1-F6EECF244321}">
+                <p14:modId xmlns:p14="http://schemas.microsoft.com/office/powerpoint/2010/main" val="1593200848"/>
+              </p:ext>
+            </p:extLst>
+          </p:nvPr>
+        </p:nvGraphicFramePr>
+        <p:xfrm>
+          <a:off x="581025" y="2181225"/>
+          <a:ext cx="11029950" cy="3678238"/>
+        </p:xfrm>
+        <a:graphic>
+          <a:graphicData uri="http://schemas.openxmlformats.org/drawingml/2006/diagram">
+            <dgm:relIds xmlns:dgm="http://schemas.openxmlformats.org/drawingml/2006/diagram" xmlns:r="http://schemas.openxmlformats.org/officeDocument/2006/relationships" r:dm="rId2" r:lo="rId3" r:qs="rId4" r:cs="rId5"/>
+          </a:graphicData>
+        </a:graphic>
+      </p:graphicFrame>
     </p:spTree>
     <p:extLst>
       <p:ext uri="{BB962C8B-B14F-4D97-AF65-F5344CB8AC3E}">
@@ -5285,7 +8395,7 @@
         </p:nvSpPr>
         <p:spPr>
           <a:xfrm>
-            <a:off x="5274570" y="2733251"/>
+            <a:off x="5359950" y="2862286"/>
             <a:ext cx="1120820" cy="923330"/>
           </a:xfrm>
           <a:prstGeom prst="rect">
@@ -5373,13 +8483,8 @@
             </a:pPr>
             <a:r>
               <a:rPr lang="da-DK" dirty="0"/>
-              <a:t>Sen </a:t>
-            </a:r>
-            <a:r>
-              <a:rPr lang="da-DK" dirty="0" err="1"/>
-              <a:t>deployment</a:t>
-            </a:r>
-            <a:endParaRPr lang="da-DK" dirty="0"/>
+              <a:t>Sen deployment</a:t>
+            </a:r>
           </a:p>
           <a:p>
             <a:pPr marL="285750" indent="-285750">
@@ -5785,6 +8890,14 @@
 <file path=ppt/slides/slide8.xml><?xml version="1.0" encoding="utf-8"?>
 <p:sld xmlns:a="http://schemas.openxmlformats.org/drawingml/2006/main" xmlns:r="http://schemas.openxmlformats.org/officeDocument/2006/relationships" xmlns:p="http://schemas.openxmlformats.org/presentationml/2006/main">
   <p:cSld>
+    <p:bg>
+      <p:bgPr>
+        <a:solidFill>
+          <a:schemeClr val="bg1"/>
+        </a:solidFill>
+        <a:effectLst/>
+      </p:bgPr>
+    </p:bg>
     <p:spTree>
       <p:nvGrpSpPr>
         <p:cNvPr id="1" name=""/>
@@ -5799,6 +8912,120 @@
           <a:chExt cx="0" cy="0"/>
         </a:xfrm>
       </p:grpSpPr>
+      <p:sp useBgFill="1">
+        <p:nvSpPr>
+          <p:cNvPr id="10" name="Rectangle 9">
+            <a:extLst>
+              <a:ext uri="{FF2B5EF4-FFF2-40B4-BE49-F238E27FC236}">
+                <a16:creationId xmlns:a16="http://schemas.microsoft.com/office/drawing/2014/main" id="{879A26B8-6C4E-452B-ADD3-ED324A7AB7E8}"/>
+              </a:ext>
+              <a:ext uri="{C183D7F6-B498-43B3-948B-1728B52AA6E4}">
+                <adec:decorative xmlns:adec="http://schemas.microsoft.com/office/drawing/2017/decorative" val="1"/>
+              </a:ext>
+            </a:extLst>
+          </p:cNvPr>
+          <p:cNvSpPr>
+            <a:spLocks noGrp="1" noRot="1" noChangeAspect="1" noMove="1" noResize="1" noEditPoints="1" noAdjustHandles="1" noChangeArrowheads="1" noChangeShapeType="1" noTextEdit="1"/>
+          </p:cNvSpPr>
+          <p:nvPr>
+            <p:extLst>
+              <p:ext uri="{386F3935-93C4-4BCD-93E2-E3B085C9AB24}">
+                <p16:designElem xmlns:p16="http://schemas.microsoft.com/office/powerpoint/2015/main" val="1"/>
+              </p:ext>
+            </p:extLst>
+          </p:nvPr>
+        </p:nvSpPr>
+        <p:spPr>
+          <a:xfrm>
+            <a:off x="0" y="0"/>
+            <a:ext cx="12192000" cy="6857999"/>
+          </a:xfrm>
+          <a:prstGeom prst="rect">
+            <a:avLst/>
+          </a:prstGeom>
+          <a:ln>
+            <a:noFill/>
+          </a:ln>
+        </p:spPr>
+        <p:style>
+          <a:lnRef idx="2">
+            <a:schemeClr val="accent1">
+              <a:shade val="50000"/>
+            </a:schemeClr>
+          </a:lnRef>
+          <a:fillRef idx="1">
+            <a:schemeClr val="accent1"/>
+          </a:fillRef>
+          <a:effectRef idx="0">
+            <a:schemeClr val="accent1"/>
+          </a:effectRef>
+          <a:fontRef idx="minor">
+            <a:schemeClr val="lt1"/>
+          </a:fontRef>
+        </p:style>
+        <p:txBody>
+          <a:bodyPr rtlCol="0" anchor="ctr"/>
+          <a:lstStyle/>
+          <a:p>
+            <a:pPr algn="ctr"/>
+            <a:endParaRPr lang="en-US"/>
+          </a:p>
+        </p:txBody>
+      </p:sp>
+      <p:sp>
+        <p:nvSpPr>
+          <p:cNvPr id="12" name="Rectangle 11">
+            <a:extLst>
+              <a:ext uri="{FF2B5EF4-FFF2-40B4-BE49-F238E27FC236}">
+                <a16:creationId xmlns:a16="http://schemas.microsoft.com/office/drawing/2014/main" id="{9B4167E1-E2B0-4192-8DA2-6967DDFF87A5}"/>
+              </a:ext>
+              <a:ext uri="{C183D7F6-B498-43B3-948B-1728B52AA6E4}">
+                <adec:decorative xmlns:adec="http://schemas.microsoft.com/office/drawing/2017/decorative" val="1"/>
+              </a:ext>
+            </a:extLst>
+          </p:cNvPr>
+          <p:cNvSpPr>
+            <a:spLocks noGrp="1" noRot="1" noChangeAspect="1" noMove="1" noResize="1" noEditPoints="1" noAdjustHandles="1" noChangeArrowheads="1" noChangeShapeType="1" noTextEdit="1"/>
+          </p:cNvSpPr>
+          <p:nvPr>
+            <p:extLst>
+              <p:ext uri="{386F3935-93C4-4BCD-93E2-E3B085C9AB24}">
+                <p16:designElem xmlns:p16="http://schemas.microsoft.com/office/powerpoint/2015/main" val="1"/>
+              </p:ext>
+            </p:extLst>
+          </p:nvPr>
+        </p:nvSpPr>
+        <p:spPr>
+          <a:xfrm>
+            <a:off x="442377" y="614407"/>
+            <a:ext cx="5609967" cy="5611772"/>
+          </a:xfrm>
+          <a:prstGeom prst="rect">
+            <a:avLst/>
+          </a:prstGeom>
+          <a:solidFill>
+            <a:schemeClr val="accent1"/>
+          </a:solidFill>
+          <a:ln>
+            <a:noFill/>
+          </a:ln>
+          <a:effectLst/>
+        </p:spPr>
+        <p:style>
+          <a:lnRef idx="1">
+            <a:schemeClr val="accent1"/>
+          </a:lnRef>
+          <a:fillRef idx="3">
+            <a:schemeClr val="accent1"/>
+          </a:fillRef>
+          <a:effectRef idx="2">
+            <a:schemeClr val="accent1"/>
+          </a:effectRef>
+          <a:fontRef idx="minor">
+            <a:schemeClr val="lt1"/>
+          </a:fontRef>
+        </p:style>
+      </p:sp>
       <p:sp>
         <p:nvSpPr>
           <p:cNvPr id="2" name="Titel 1">
@@ -5815,17 +9042,136 @@
             <p:ph type="title"/>
           </p:nvPr>
         </p:nvSpPr>
-        <p:spPr/>
+        <p:spPr>
+          <a:xfrm>
+            <a:off x="762121" y="960723"/>
+            <a:ext cx="4968489" cy="1013800"/>
+          </a:xfrm>
+        </p:spPr>
         <p:txBody>
-          <a:bodyPr/>
+          <a:bodyPr>
+            <a:normAutofit/>
+          </a:bodyPr>
           <a:lstStyle/>
           <a:p>
             <a:r>
-              <a:rPr lang="da-DK" dirty="0"/>
+              <a:rPr lang="da-DK" dirty="0">
+                <a:solidFill>
+                  <a:srgbClr val="FFFFFF"/>
+                </a:solidFill>
+              </a:rPr>
               <a:t>Demonstration</a:t>
             </a:r>
           </a:p>
         </p:txBody>
+      </p:sp>
+      <p:sp>
+        <p:nvSpPr>
+          <p:cNvPr id="20" name="Rectangle 13">
+            <a:extLst>
+              <a:ext uri="{FF2B5EF4-FFF2-40B4-BE49-F238E27FC236}">
+                <a16:creationId xmlns:a16="http://schemas.microsoft.com/office/drawing/2014/main" id="{D03E4FEE-2E6A-44AB-B6BA-C1AD0CD6D93B}"/>
+              </a:ext>
+              <a:ext uri="{C183D7F6-B498-43B3-948B-1728B52AA6E4}">
+                <adec:decorative xmlns:adec="http://schemas.microsoft.com/office/drawing/2017/decorative" val="1"/>
+              </a:ext>
+            </a:extLst>
+          </p:cNvPr>
+          <p:cNvSpPr>
+            <a:spLocks noGrp="1" noRot="1" noChangeAspect="1" noMove="1" noResize="1" noEditPoints="1" noAdjustHandles="1" noChangeArrowheads="1" noChangeShapeType="1" noTextEdit="1"/>
+          </p:cNvSpPr>
+          <p:nvPr>
+            <p:extLst>
+              <p:ext uri="{386F3935-93C4-4BCD-93E2-E3B085C9AB24}">
+                <p16:designElem xmlns:p16="http://schemas.microsoft.com/office/powerpoint/2015/main" val="1"/>
+              </p:ext>
+            </p:extLst>
+          </p:nvPr>
+        </p:nvSpPr>
+        <p:spPr>
+          <a:xfrm>
+            <a:off x="446534" y="457200"/>
+            <a:ext cx="5605810" cy="94997"/>
+          </a:xfrm>
+          <a:prstGeom prst="rect">
+            <a:avLst/>
+          </a:prstGeom>
+          <a:solidFill>
+            <a:schemeClr val="accent1"/>
+          </a:solidFill>
+          <a:ln>
+            <a:noFill/>
+          </a:ln>
+          <a:effectLst/>
+        </p:spPr>
+        <p:style>
+          <a:lnRef idx="1">
+            <a:schemeClr val="accent1"/>
+          </a:lnRef>
+          <a:fillRef idx="3">
+            <a:schemeClr val="accent1"/>
+          </a:fillRef>
+          <a:effectRef idx="2">
+            <a:schemeClr val="accent1"/>
+          </a:effectRef>
+          <a:fontRef idx="minor">
+            <a:schemeClr val="lt1"/>
+          </a:fontRef>
+        </p:style>
+      </p:sp>
+      <p:sp>
+        <p:nvSpPr>
+          <p:cNvPr id="21" name="Rectangle 15">
+            <a:extLst>
+              <a:ext uri="{FF2B5EF4-FFF2-40B4-BE49-F238E27FC236}">
+                <a16:creationId xmlns:a16="http://schemas.microsoft.com/office/drawing/2014/main" id="{0817EB59-13B3-43DA-9B91-A7CC174A6069}"/>
+              </a:ext>
+              <a:ext uri="{C183D7F6-B498-43B3-948B-1728B52AA6E4}">
+                <adec:decorative xmlns:adec="http://schemas.microsoft.com/office/drawing/2017/decorative" val="1"/>
+              </a:ext>
+            </a:extLst>
+          </p:cNvPr>
+          <p:cNvSpPr>
+            <a:spLocks noGrp="1" noRot="1" noChangeAspect="1" noMove="1" noResize="1" noEditPoints="1" noAdjustHandles="1" noChangeArrowheads="1" noChangeShapeType="1" noTextEdit="1"/>
+          </p:cNvSpPr>
+          <p:nvPr>
+            <p:extLst>
+              <p:ext uri="{386F3935-93C4-4BCD-93E2-E3B085C9AB24}">
+                <p16:designElem xmlns:p16="http://schemas.microsoft.com/office/powerpoint/2015/main" val="1"/>
+              </p:ext>
+            </p:extLst>
+          </p:nvPr>
+        </p:nvSpPr>
+        <p:spPr>
+          <a:xfrm>
+            <a:off x="6144318" y="457200"/>
+            <a:ext cx="5600007" cy="91440"/>
+          </a:xfrm>
+          <a:prstGeom prst="rect">
+            <a:avLst/>
+          </a:prstGeom>
+          <a:solidFill>
+            <a:schemeClr val="accent2"/>
+          </a:solidFill>
+          <a:ln>
+            <a:noFill/>
+          </a:ln>
+          <a:effectLst/>
+        </p:spPr>
+        <p:style>
+          <a:lnRef idx="1">
+            <a:schemeClr val="accent1"/>
+          </a:lnRef>
+          <a:fillRef idx="3">
+            <a:schemeClr val="accent1"/>
+          </a:fillRef>
+          <a:effectRef idx="2">
+            <a:schemeClr val="accent1"/>
+          </a:effectRef>
+          <a:fontRef idx="minor">
+            <a:schemeClr val="lt1"/>
+          </a:fontRef>
+        </p:style>
       </p:sp>
       <p:sp>
         <p:nvSpPr>
@@ -5843,15 +9189,128 @@
             <p:ph idx="1"/>
           </p:nvPr>
         </p:nvSpPr>
-        <p:spPr/>
+        <p:spPr>
+          <a:xfrm>
+            <a:off x="783387" y="2254102"/>
+            <a:ext cx="4947221" cy="3650344"/>
+          </a:xfrm>
+        </p:spPr>
         <p:txBody>
-          <a:bodyPr/>
+          <a:bodyPr>
+            <a:normAutofit/>
+          </a:bodyPr>
           <a:lstStyle/>
           <a:p>
-            <a:endParaRPr lang="da-DK"/>
+            <a:endParaRPr lang="da-DK" dirty="0">
+              <a:solidFill>
+                <a:srgbClr val="FFFFFF"/>
+              </a:solidFill>
+            </a:endParaRPr>
           </a:p>
         </p:txBody>
       </p:sp>
+      <p:sp>
+        <p:nvSpPr>
+          <p:cNvPr id="22" name="Rectangle 17">
+            <a:extLst>
+              <a:ext uri="{FF2B5EF4-FFF2-40B4-BE49-F238E27FC236}">
+                <a16:creationId xmlns:a16="http://schemas.microsoft.com/office/drawing/2014/main" id="{C5F09389-6A8E-46D6-B5F4-A3C55FAE62EA}"/>
+              </a:ext>
+              <a:ext uri="{C183D7F6-B498-43B3-948B-1728B52AA6E4}">
+                <adec:decorative xmlns:adec="http://schemas.microsoft.com/office/drawing/2017/decorative" val="1"/>
+              </a:ext>
+            </a:extLst>
+          </p:cNvPr>
+          <p:cNvSpPr>
+            <a:spLocks noGrp="1" noRot="1" noChangeAspect="1" noMove="1" noResize="1" noEditPoints="1" noAdjustHandles="1" noChangeArrowheads="1" noChangeShapeType="1" noTextEdit="1"/>
+          </p:cNvSpPr>
+          <p:nvPr>
+            <p:extLst>
+              <p:ext uri="{386F3935-93C4-4BCD-93E2-E3B085C9AB24}">
+                <p16:designElem xmlns:p16="http://schemas.microsoft.com/office/powerpoint/2015/main" val="1"/>
+              </p:ext>
+            </p:extLst>
+          </p:nvPr>
+        </p:nvSpPr>
+        <p:spPr>
+          <a:xfrm>
+            <a:off x="6144319" y="619125"/>
+            <a:ext cx="5600006" cy="5607054"/>
+          </a:xfrm>
+          <a:prstGeom prst="rect">
+            <a:avLst/>
+          </a:prstGeom>
+          <a:solidFill>
+            <a:schemeClr val="bg1"/>
+          </a:solidFill>
+          <a:ln>
+            <a:noFill/>
+          </a:ln>
+        </p:spPr>
+        <p:style>
+          <a:lnRef idx="2">
+            <a:schemeClr val="accent1">
+              <a:shade val="50000"/>
+            </a:schemeClr>
+          </a:lnRef>
+          <a:fillRef idx="1">
+            <a:schemeClr val="accent1"/>
+          </a:fillRef>
+          <a:effectRef idx="0">
+            <a:schemeClr val="accent1"/>
+          </a:effectRef>
+          <a:fontRef idx="minor">
+            <a:schemeClr val="lt1"/>
+          </a:fontRef>
+        </p:style>
+        <p:txBody>
+          <a:bodyPr rtlCol="0" anchor="ctr"/>
+          <a:lstStyle/>
+          <a:p>
+            <a:pPr algn="ctr"/>
+            <a:endParaRPr lang="en-US"/>
+          </a:p>
+        </p:txBody>
+      </p:sp>
+      <p:pic>
+        <p:nvPicPr>
+          <p:cNvPr id="7" name="Graphic 6">
+            <a:extLst>
+              <a:ext uri="{FF2B5EF4-FFF2-40B4-BE49-F238E27FC236}">
+                <a16:creationId xmlns:a16="http://schemas.microsoft.com/office/drawing/2014/main" id="{58D4C100-C52C-4252-9EA6-40DF392373F3}"/>
+              </a:ext>
+            </a:extLst>
+          </p:cNvPr>
+          <p:cNvPicPr>
+            <a:picLocks noChangeAspect="1"/>
+          </p:cNvPicPr>
+          <p:nvPr/>
+        </p:nvPicPr>
+        <p:blipFill>
+          <a:blip r:embed="rId2">
+            <a:extLst>
+              <a:ext uri="{28A0092B-C50C-407E-A947-70E740481C1C}">
+                <a14:useLocalDpi xmlns:a14="http://schemas.microsoft.com/office/drawing/2010/main" val="0"/>
+              </a:ext>
+              <a:ext uri="{96DAC541-7B7A-43D3-8B79-37D633B846F1}">
+                <asvg:svgBlip xmlns:asvg="http://schemas.microsoft.com/office/drawing/2016/SVG/main" r:embed="rId3"/>
+              </a:ext>
+            </a:extLst>
+          </a:blip>
+          <a:stretch>
+            <a:fillRect/>
+          </a:stretch>
+        </p:blipFill>
+        <p:spPr>
+          <a:xfrm>
+            <a:off x="6471493" y="960723"/>
+            <a:ext cx="4945656" cy="4945656"/>
+          </a:xfrm>
+          <a:prstGeom prst="rect">
+            <a:avLst/>
+          </a:prstGeom>
+        </p:spPr>
+      </p:pic>
     </p:spTree>
     <p:extLst>
       <p:ext uri="{BB962C8B-B14F-4D97-AF65-F5344CB8AC3E}">

</xml_diff>

<commit_message>
Update The Next præsentation.pptx
</commit_message>
<xml_diff>
--- a/The Next præsentation.pptx
+++ b/The Next præsentation.pptx
@@ -926,10 +926,14 @@
         <a:lstStyle/>
         <a:p>
           <a:r>
-            <a:rPr lang="da-DK"/>
-            <a:t>YourLocal API</a:t>
+            <a:rPr lang="da-DK" dirty="0" err="1"/>
+            <a:t>YourLocal</a:t>
           </a:r>
-          <a:endParaRPr lang="en-US"/>
+          <a:r>
+            <a:rPr lang="da-DK" dirty="0"/>
+            <a:t> API</a:t>
+          </a:r>
+          <a:endParaRPr lang="en-US" dirty="0"/>
         </a:p>
       </dgm:t>
     </dgm:pt>
@@ -1281,10 +1285,14 @@
             <a:buNone/>
           </a:pPr>
           <a:r>
-            <a:rPr lang="da-DK" sz="3100" kern="1200"/>
-            <a:t>YourLocal API</a:t>
+            <a:rPr lang="da-DK" sz="3100" kern="1200" dirty="0" err="1"/>
+            <a:t>YourLocal</a:t>
           </a:r>
-          <a:endParaRPr lang="en-US" sz="3100" kern="1200"/>
+          <a:r>
+            <a:rPr lang="da-DK" sz="3100" kern="1200" dirty="0"/>
+            <a:t> API</a:t>
+          </a:r>
+          <a:endParaRPr lang="en-US" sz="3100" kern="1200" dirty="0"/>
         </a:p>
       </dsp:txBody>
       <dsp:txXfrm>
@@ -2944,7 +2952,7 @@
           <a:p>
             <a:fld id="{E61A9C3B-90A7-4284-A63B-100477C064F8}" type="datetimeFigureOut">
               <a:rPr lang="da-DK" smtClean="0"/>
-              <a:t>13-01-2019</a:t>
+              <a:t>14-01-2019</a:t>
             </a:fld>
             <a:endParaRPr lang="da-DK"/>
           </a:p>
@@ -3704,7 +3712,7 @@
           <a:p>
             <a:fld id="{4C52EC6D-AFBA-4F6F-A64F-BA455C0AB0BC}" type="datetimeFigureOut">
               <a:rPr lang="da-DK" smtClean="0"/>
-              <a:t>13-01-2019</a:t>
+              <a:t>14-01-2019</a:t>
             </a:fld>
             <a:endParaRPr lang="da-DK"/>
           </a:p>
@@ -3966,7 +3974,7 @@
           <a:p>
             <a:fld id="{4C52EC6D-AFBA-4F6F-A64F-BA455C0AB0BC}" type="datetimeFigureOut">
               <a:rPr lang="da-DK" smtClean="0"/>
-              <a:t>13-01-2019</a:t>
+              <a:t>14-01-2019</a:t>
             </a:fld>
             <a:endParaRPr lang="da-DK"/>
           </a:p>
@@ -4201,7 +4209,7 @@
           <a:p>
             <a:fld id="{4C52EC6D-AFBA-4F6F-A64F-BA455C0AB0BC}" type="datetimeFigureOut">
               <a:rPr lang="da-DK" smtClean="0"/>
-              <a:t>13-01-2019</a:t>
+              <a:t>14-01-2019</a:t>
             </a:fld>
             <a:endParaRPr lang="da-DK"/>
           </a:p>
@@ -4441,7 +4449,7 @@
           <a:p>
             <a:fld id="{4C52EC6D-AFBA-4F6F-A64F-BA455C0AB0BC}" type="datetimeFigureOut">
               <a:rPr lang="da-DK" smtClean="0"/>
-              <a:t>13-01-2019</a:t>
+              <a:t>14-01-2019</a:t>
             </a:fld>
             <a:endParaRPr lang="da-DK"/>
           </a:p>
@@ -4748,7 +4756,7 @@
           <a:p>
             <a:fld id="{4C52EC6D-AFBA-4F6F-A64F-BA455C0AB0BC}" type="datetimeFigureOut">
               <a:rPr lang="da-DK" smtClean="0"/>
-              <a:t>13-01-2019</a:t>
+              <a:t>14-01-2019</a:t>
             </a:fld>
             <a:endParaRPr lang="da-DK"/>
           </a:p>
@@ -5050,7 +5058,7 @@
           <a:p>
             <a:fld id="{4C52EC6D-AFBA-4F6F-A64F-BA455C0AB0BC}" type="datetimeFigureOut">
               <a:rPr lang="da-DK" smtClean="0"/>
-              <a:t>13-01-2019</a:t>
+              <a:t>14-01-2019</a:t>
             </a:fld>
             <a:endParaRPr lang="da-DK"/>
           </a:p>
@@ -5472,7 +5480,7 @@
           <a:p>
             <a:fld id="{4C52EC6D-AFBA-4F6F-A64F-BA455C0AB0BC}" type="datetimeFigureOut">
               <a:rPr lang="da-DK" smtClean="0"/>
-              <a:t>13-01-2019</a:t>
+              <a:t>14-01-2019</a:t>
             </a:fld>
             <a:endParaRPr lang="da-DK"/>
           </a:p>
@@ -5634,7 +5642,7 @@
           <a:p>
             <a:fld id="{4C52EC6D-AFBA-4F6F-A64F-BA455C0AB0BC}" type="datetimeFigureOut">
               <a:rPr lang="da-DK" smtClean="0"/>
-              <a:t>13-01-2019</a:t>
+              <a:t>14-01-2019</a:t>
             </a:fld>
             <a:endParaRPr lang="da-DK"/>
           </a:p>
@@ -5729,7 +5737,7 @@
           <a:p>
             <a:fld id="{4C52EC6D-AFBA-4F6F-A64F-BA455C0AB0BC}" type="datetimeFigureOut">
               <a:rPr lang="da-DK" smtClean="0"/>
-              <a:t>13-01-2019</a:t>
+              <a:t>14-01-2019</a:t>
             </a:fld>
             <a:endParaRPr lang="da-DK"/>
           </a:p>
@@ -6107,7 +6115,7 @@
           <a:p>
             <a:fld id="{4C52EC6D-AFBA-4F6F-A64F-BA455C0AB0BC}" type="datetimeFigureOut">
               <a:rPr lang="da-DK" smtClean="0"/>
-              <a:t>13-01-2019</a:t>
+              <a:t>14-01-2019</a:t>
             </a:fld>
             <a:endParaRPr lang="da-DK"/>
           </a:p>
@@ -6396,7 +6404,7 @@
           <a:p>
             <a:fld id="{4C52EC6D-AFBA-4F6F-A64F-BA455C0AB0BC}" type="datetimeFigureOut">
               <a:rPr lang="da-DK" smtClean="0"/>
-              <a:t>13-01-2019</a:t>
+              <a:t>14-01-2019</a:t>
             </a:fld>
             <a:endParaRPr lang="da-DK"/>
           </a:p>
@@ -6607,7 +6615,7 @@
           <a:p>
             <a:fld id="{4C52EC6D-AFBA-4F6F-A64F-BA455C0AB0BC}" type="datetimeFigureOut">
               <a:rPr lang="da-DK" smtClean="0"/>
-              <a:t>13-01-2019</a:t>
+              <a:t>14-01-2019</a:t>
             </a:fld>
             <a:endParaRPr lang="da-DK"/>
           </a:p>
@@ -7602,46 +7610,16 @@
           <a:p>
             <a:r>
               <a:rPr lang="da-DK" dirty="0"/>
-              <a:t>De 4 P’er</a:t>
-            </a:r>
-          </a:p>
-          <a:p>
-            <a:pPr lvl="1"/>
+              <a:t>Rollefordeling</a:t>
+            </a:r>
+          </a:p>
+          <a:p>
             <a:r>
               <a:rPr lang="da-DK" dirty="0"/>
-              <a:t>People</a:t>
-            </a:r>
-          </a:p>
-          <a:p>
-            <a:pPr lvl="2"/>
-            <a:r>
-              <a:rPr lang="da-DK" dirty="0"/>
-              <a:t>Rollefordeling</a:t>
-            </a:r>
-          </a:p>
-          <a:p>
-            <a:pPr lvl="1"/>
-            <a:r>
-              <a:rPr lang="da-DK" dirty="0"/>
-              <a:t>Product</a:t>
-            </a:r>
-          </a:p>
-          <a:p>
-            <a:pPr lvl="2"/>
-            <a:r>
-              <a:rPr lang="da-DK" dirty="0"/>
-              <a:t>Geolokation/API</a:t>
-            </a:r>
-          </a:p>
-          <a:p>
-            <a:pPr lvl="1"/>
-            <a:r>
-              <a:rPr lang="da-DK" dirty="0"/>
-              <a:t>Project</a:t>
-            </a:r>
-          </a:p>
-          <a:p>
-            <a:pPr lvl="2"/>
+              <a:t>API &amp; Geolokation</a:t>
+            </a:r>
+          </a:p>
+          <a:p>
             <a:r>
               <a:rPr lang="da-DK" dirty="0"/>
               <a:t>UP </a:t>
@@ -7661,14 +7639,6 @@
             <a:endParaRPr lang="da-DK" dirty="0"/>
           </a:p>
           <a:p>
-            <a:pPr lvl="1"/>
-            <a:r>
-              <a:rPr lang="da-DK" dirty="0"/>
-              <a:t>Process</a:t>
-            </a:r>
-          </a:p>
-          <a:p>
-            <a:pPr lvl="2"/>
             <a:r>
               <a:rPr lang="da-DK" dirty="0" err="1"/>
               <a:t>Function</a:t>
@@ -7679,7 +7649,6 @@
             </a:r>
           </a:p>
           <a:p>
-            <a:pPr lvl="2"/>
             <a:r>
               <a:rPr lang="da-DK" dirty="0" err="1"/>
               <a:t>Quality</a:t>
@@ -7873,8 +7842,8 @@
         </p:nvSpPr>
         <p:spPr>
           <a:xfrm>
-            <a:off x="959157" y="1113764"/>
-            <a:ext cx="3269749" cy="4624327"/>
+            <a:off x="757534" y="1113763"/>
+            <a:ext cx="3640835" cy="4624327"/>
           </a:xfrm>
         </p:spPr>
         <p:txBody>
@@ -7890,7 +7859,7 @@
                   <a:srgbClr val="FFFFFF"/>
                 </a:solidFill>
               </a:rPr>
-              <a:t>People</a:t>
+              <a:t>Rollefordeling</a:t>
             </a:r>
           </a:p>
         </p:txBody>
@@ -7913,26 +7882,15 @@
         </p:nvSpPr>
         <p:spPr>
           <a:xfrm>
-            <a:off x="5155905" y="1113764"/>
-            <a:ext cx="6108179" cy="4624327"/>
+            <a:off x="4932277" y="737118"/>
+            <a:ext cx="6331807" cy="5000973"/>
           </a:xfrm>
         </p:spPr>
         <p:txBody>
           <a:bodyPr anchor="ctr">
-            <a:normAutofit fontScale="92500" lnSpcReduction="20000"/>
+            <a:normAutofit lnSpcReduction="10000"/>
           </a:bodyPr>
           <a:lstStyle/>
-          <a:p>
-            <a:pPr>
-              <a:lnSpc>
-                <a:spcPct val="90000"/>
-              </a:lnSpc>
-            </a:pPr>
-            <a:r>
-              <a:rPr lang="da-DK" sz="1300" dirty="0"/>
-              <a:t>Rollefordeling</a:t>
-            </a:r>
-          </a:p>
           <a:p>
             <a:pPr lvl="1">
               <a:lnSpc>
@@ -8073,7 +8031,7 @@
             </a:pPr>
             <a:r>
               <a:rPr lang="da-DK" sz="1300" dirty="0"/>
-              <a:t>Formål?</a:t>
+              <a:t>Fordele &amp; ulemper</a:t>
             </a:r>
           </a:p>
           <a:p>
@@ -8201,12 +8159,12 @@
           <a:lstStyle/>
           <a:p>
             <a:r>
-              <a:rPr lang="da-DK">
+              <a:rPr lang="da-DK" dirty="0">
                 <a:solidFill>
                   <a:srgbClr val="FFFEFF"/>
                 </a:solidFill>
               </a:rPr>
-              <a:t>Product</a:t>
+              <a:t>API &amp; Geolokation</a:t>
             </a:r>
           </a:p>
         </p:txBody>
@@ -8295,7 +8253,7 @@
           <a:p>
             <a:r>
               <a:rPr lang="da-DK" dirty="0"/>
-              <a:t>Project</a:t>
+              <a:t>UP VS SCRUM</a:t>
             </a:r>
           </a:p>
         </p:txBody>

</xml_diff>